<commit_message>
ASM lecture and video
</commit_message>
<xml_diff>
--- a/static/lectures/lecture03-x86-asm/lecture03-x86-asm.pptx
+++ b/static/lectures/lecture03-x86-asm/lecture03-x86-asm.pptx
@@ -10894,7 +10894,7 @@
             <a:pPr lvl="0" algn="ctr"/>
             <a:r>
               <a:rPr lang="en-US" sz="2600" dirty="0"/>
-              <a:t>January, 2024</a:t>
+              <a:t>January, 2025</a:t>
             </a:r>
           </a:p>
           <a:p>
@@ -17173,6 +17173,36 @@
           </a:p>
         </p:txBody>
       </p:sp>
+      <p:pic>
+        <p:nvPicPr>
+          <p:cNvPr id="4" name="Picture 3">
+            <a:extLst>
+              <a:ext uri="{FF2B5EF4-FFF2-40B4-BE49-F238E27FC236}">
+                <a16:creationId xmlns:a16="http://schemas.microsoft.com/office/drawing/2014/main" id="{062DC96E-1FF1-004A-E3C9-D4BF23EBAB60}"/>
+              </a:ext>
+            </a:extLst>
+          </p:cNvPr>
+          <p:cNvPicPr>
+            <a:picLocks noChangeAspect="1"/>
+          </p:cNvPicPr>
+          <p:nvPr/>
+        </p:nvPicPr>
+        <p:blipFill>
+          <a:blip r:embed="rId3"/>
+          <a:stretch>
+            <a:fillRect/>
+          </a:stretch>
+        </p:blipFill>
+        <p:spPr>
+          <a:xfrm>
+            <a:off x="6944809" y="4413068"/>
+            <a:ext cx="2543556" cy="2543556"/>
+          </a:xfrm>
+          <a:prstGeom prst="rect">
+            <a:avLst/>
+          </a:prstGeom>
+        </p:spPr>
+      </p:pic>
     </p:spTree>
     <p:extLst>
       <p:ext uri="{BB962C8B-B14F-4D97-AF65-F5344CB8AC3E}">

</xml_diff>

<commit_message>
Add video and slides for calling conventions
</commit_message>
<xml_diff>
--- a/static/lectures/lecture03-x86-asm/lecture03-x86-asm.pptx
+++ b/static/lectures/lecture03-x86-asm/lecture03-x86-asm.pptx
@@ -5,10 +5,10 @@
     <p:sldMasterId id="2147483648" r:id="rId1"/>
   </p:sldMasterIdLst>
   <p:notesMasterIdLst>
-    <p:notesMasterId r:id="rId60"/>
+    <p:notesMasterId r:id="rId66"/>
   </p:notesMasterIdLst>
   <p:handoutMasterIdLst>
-    <p:handoutMasterId r:id="rId61"/>
+    <p:handoutMasterId r:id="rId67"/>
   </p:handoutMasterIdLst>
   <p:sldIdLst>
     <p:sldId id="256" r:id="rId2"/>
@@ -56,19 +56,25 @@
     <p:sldId id="292" r:id="rId44"/>
     <p:sldId id="293" r:id="rId45"/>
     <p:sldId id="294" r:id="rId46"/>
-    <p:sldId id="295" r:id="rId47"/>
-    <p:sldId id="296" r:id="rId48"/>
-    <p:sldId id="297" r:id="rId49"/>
-    <p:sldId id="298" r:id="rId50"/>
-    <p:sldId id="299" r:id="rId51"/>
-    <p:sldId id="300" r:id="rId52"/>
-    <p:sldId id="301" r:id="rId53"/>
-    <p:sldId id="302" r:id="rId54"/>
-    <p:sldId id="303" r:id="rId55"/>
-    <p:sldId id="304" r:id="rId56"/>
-    <p:sldId id="305" r:id="rId57"/>
-    <p:sldId id="306" r:id="rId58"/>
-    <p:sldId id="307" r:id="rId59"/>
+    <p:sldId id="314" r:id="rId47"/>
+    <p:sldId id="315" r:id="rId48"/>
+    <p:sldId id="316" r:id="rId49"/>
+    <p:sldId id="317" r:id="rId50"/>
+    <p:sldId id="318" r:id="rId51"/>
+    <p:sldId id="319" r:id="rId52"/>
+    <p:sldId id="295" r:id="rId53"/>
+    <p:sldId id="296" r:id="rId54"/>
+    <p:sldId id="297" r:id="rId55"/>
+    <p:sldId id="298" r:id="rId56"/>
+    <p:sldId id="299" r:id="rId57"/>
+    <p:sldId id="300" r:id="rId58"/>
+    <p:sldId id="301" r:id="rId59"/>
+    <p:sldId id="302" r:id="rId60"/>
+    <p:sldId id="303" r:id="rId61"/>
+    <p:sldId id="304" r:id="rId62"/>
+    <p:sldId id="305" r:id="rId63"/>
+    <p:sldId id="307" r:id="rId64"/>
+    <p:sldId id="306" r:id="rId65"/>
   </p:sldIdLst>
   <p:sldSz cx="10080625" cy="7559675"/>
   <p:notesSz cx="7772400" cy="10058400"/>
@@ -217,6 +223,12 @@
             <p14:sldId id="292"/>
             <p14:sldId id="293"/>
             <p14:sldId id="294"/>
+            <p14:sldId id="314"/>
+            <p14:sldId id="315"/>
+            <p14:sldId id="316"/>
+            <p14:sldId id="317"/>
+            <p14:sldId id="318"/>
+            <p14:sldId id="319"/>
             <p14:sldId id="295"/>
             <p14:sldId id="296"/>
             <p14:sldId id="297"/>
@@ -228,8 +240,8 @@
             <p14:sldId id="303"/>
             <p14:sldId id="304"/>
             <p14:sldId id="305"/>
+            <p14:sldId id="307"/>
             <p14:sldId id="306"/>
-            <p14:sldId id="307"/>
           </p14:sldIdLst>
         </p14:section>
       </p14:sectionLst>
@@ -5535,7 +5547,13 @@
   <p:cSld>
     <p:spTree>
       <p:nvGrpSpPr>
-        <p:cNvPr id="1" name=""/>
+        <p:cNvPr id="1" name="">
+          <a:extLst>
+            <a:ext uri="{FF2B5EF4-FFF2-40B4-BE49-F238E27FC236}">
+              <a16:creationId xmlns:a16="http://schemas.microsoft.com/office/drawing/2014/main" id="{D024B749-74A4-139A-0214-294DA1CA2924}"/>
+            </a:ext>
+          </a:extLst>
+        </p:cNvPr>
         <p:cNvGrpSpPr/>
         <p:nvPr/>
       </p:nvGrpSpPr>
@@ -5552,7 +5570,7 @@
           <p:cNvPr id="7" name="Slide Number Placeholder 6">
             <a:extLst>
               <a:ext uri="{FF2B5EF4-FFF2-40B4-BE49-F238E27FC236}">
-                <a16:creationId xmlns:a16="http://schemas.microsoft.com/office/drawing/2014/main" id="{19DDC3AB-A14D-7C41-B042-E9DFFC1841D3}"/>
+                <a16:creationId xmlns:a16="http://schemas.microsoft.com/office/drawing/2014/main" id="{FB2E95BA-E3F9-C939-227B-FD72E5B64877}"/>
               </a:ext>
             </a:extLst>
           </p:cNvPr>
@@ -5573,7 +5591,7 @@
           <a:lstStyle/>
           <a:p>
             <a:pPr lvl="0"/>
-            <a:fld id="{729190FF-AE14-1843-A10A-2153921AE1DD}" type="slidenum">
+            <a:fld id="{FDA4B4B5-6CC4-0D46-BA94-EFFB7805E336}" type="slidenum">
               <a:t>46</a:t>
             </a:fld>
             <a:endParaRPr lang="en-US"/>
@@ -5585,7 +5603,7 @@
           <p:cNvPr id="2" name="Slide Image Placeholder 1">
             <a:extLst>
               <a:ext uri="{FF2B5EF4-FFF2-40B4-BE49-F238E27FC236}">
-                <a16:creationId xmlns:a16="http://schemas.microsoft.com/office/drawing/2014/main" id="{CE725A2C-CA39-5EF1-E122-E5E797EBF439}"/>
+                <a16:creationId xmlns:a16="http://schemas.microsoft.com/office/drawing/2014/main" id="{724D4C3F-9994-0C81-D697-340F19E72CAB}"/>
               </a:ext>
             </a:extLst>
           </p:cNvPr>
@@ -5617,7 +5635,7 @@
           <p:cNvPr id="3" name="Notes Placeholder 2">
             <a:extLst>
               <a:ext uri="{FF2B5EF4-FFF2-40B4-BE49-F238E27FC236}">
-                <a16:creationId xmlns:a16="http://schemas.microsoft.com/office/drawing/2014/main" id="{B4503751-86C6-5A6A-E04A-35B803E46A09}"/>
+                <a16:creationId xmlns:a16="http://schemas.microsoft.com/office/drawing/2014/main" id="{77A3AC4E-ACCE-C8D3-1327-5F5A0BC08188}"/>
               </a:ext>
             </a:extLst>
           </p:cNvPr>
@@ -5638,6 +5656,11 @@
         </p:txBody>
       </p:sp>
     </p:spTree>
+    <p:extLst>
+      <p:ext uri="{BB962C8B-B14F-4D97-AF65-F5344CB8AC3E}">
+        <p14:creationId xmlns:p14="http://schemas.microsoft.com/office/powerpoint/2010/main" val="2773385350"/>
+      </p:ext>
+    </p:extLst>
   </p:cSld>
   <p:clrMapOvr>
     <a:masterClrMapping/>
@@ -5650,7 +5673,13 @@
   <p:cSld>
     <p:spTree>
       <p:nvGrpSpPr>
-        <p:cNvPr id="1" name=""/>
+        <p:cNvPr id="1" name="">
+          <a:extLst>
+            <a:ext uri="{FF2B5EF4-FFF2-40B4-BE49-F238E27FC236}">
+              <a16:creationId xmlns:a16="http://schemas.microsoft.com/office/drawing/2014/main" id="{355F3B73-2756-3D70-A645-157DDB76CFD5}"/>
+            </a:ext>
+          </a:extLst>
+        </p:cNvPr>
         <p:cNvGrpSpPr/>
         <p:nvPr/>
       </p:nvGrpSpPr>
@@ -5664,10 +5693,135 @@
       </p:grpSpPr>
       <p:sp>
         <p:nvSpPr>
+          <p:cNvPr id="2" name="Slide Image Placeholder 1">
+            <a:extLst>
+              <a:ext uri="{FF2B5EF4-FFF2-40B4-BE49-F238E27FC236}">
+                <a16:creationId xmlns:a16="http://schemas.microsoft.com/office/drawing/2014/main" id="{FCFE85E4-5427-2368-CFF7-228EC680731F}"/>
+              </a:ext>
+            </a:extLst>
+          </p:cNvPr>
+          <p:cNvSpPr>
+            <a:spLocks noGrp="1" noRot="1" noChangeAspect="1"/>
+          </p:cNvSpPr>
+          <p:nvPr>
+            <p:ph type="sldImg"/>
+          </p:nvPr>
+        </p:nvSpPr>
+        <p:spPr>
+          <a:xfrm>
+            <a:off x="1371600" y="763588"/>
+            <a:ext cx="5029200" cy="3771900"/>
+          </a:xfrm>
+        </p:spPr>
+      </p:sp>
+      <p:sp>
+        <p:nvSpPr>
+          <p:cNvPr id="3" name="Notes Placeholder 2">
+            <a:extLst>
+              <a:ext uri="{FF2B5EF4-FFF2-40B4-BE49-F238E27FC236}">
+                <a16:creationId xmlns:a16="http://schemas.microsoft.com/office/drawing/2014/main" id="{10C73712-6144-4B56-7658-5670F63E563A}"/>
+              </a:ext>
+            </a:extLst>
+          </p:cNvPr>
+          <p:cNvSpPr>
+            <a:spLocks noGrp="1"/>
+          </p:cNvSpPr>
+          <p:nvPr>
+            <p:ph type="body" idx="1"/>
+          </p:nvPr>
+        </p:nvSpPr>
+        <p:spPr/>
+        <p:txBody>
+          <a:bodyPr/>
+          <a:lstStyle/>
+          <a:p>
+            <a:r>
+              <a:rPr lang="en-US"/>
+              <a:t>Do not modify the notes in this section to avoid tampering with the Poll Everywhere activity.
+More info at polleverywhere.com/support
+What is inside ebx?</a:t>
+            </a:r>
+          </a:p>
+          <a:p>
+            <a:r>
+              <a:rPr lang="en-US"/>
+              <a:t>https://www.polleverywhere.com/multiple_choice_polls/lrCccnGm68FB3B7E5O6Sj?state=opened&amp;flow=Default&amp;onscreen=persist</a:t>
+            </a:r>
+          </a:p>
+        </p:txBody>
+      </p:sp>
+      <p:sp>
+        <p:nvSpPr>
+          <p:cNvPr id="4" name="Slide Number Placeholder 3">
+            <a:extLst>
+              <a:ext uri="{FF2B5EF4-FFF2-40B4-BE49-F238E27FC236}">
+                <a16:creationId xmlns:a16="http://schemas.microsoft.com/office/drawing/2014/main" id="{85388370-A305-500C-5431-6A635C544B99}"/>
+              </a:ext>
+            </a:extLst>
+          </p:cNvPr>
+          <p:cNvSpPr>
+            <a:spLocks noGrp="1"/>
+          </p:cNvSpPr>
+          <p:nvPr>
+            <p:ph type="sldNum" sz="quarter" idx="5"/>
+          </p:nvPr>
+        </p:nvSpPr>
+        <p:spPr/>
+        <p:txBody>
+          <a:bodyPr/>
+          <a:lstStyle/>
+          <a:p>
+            <a:pPr lvl="0"/>
+            <a:fld id="{BE166643-42AB-A447-817D-435E25A5F279}" type="slidenum">
+              <a:rPr lang="en-US" smtClean="0"/>
+              <a:t>47</a:t>
+            </a:fld>
+            <a:endParaRPr lang="en-US"/>
+          </a:p>
+        </p:txBody>
+      </p:sp>
+    </p:spTree>
+    <p:extLst>
+      <p:ext uri="{BB962C8B-B14F-4D97-AF65-F5344CB8AC3E}">
+        <p14:creationId xmlns:p14="http://schemas.microsoft.com/office/powerpoint/2010/main" val="2102767776"/>
+      </p:ext>
+    </p:extLst>
+  </p:cSld>
+  <p:clrMapOvr>
+    <a:masterClrMapping/>
+  </p:clrMapOvr>
+</p:notes>
+</file>
+
+<file path=ppt/notesSlides/notesSlide48.xml><?xml version="1.0" encoding="utf-8"?>
+<p:notes xmlns:a="http://schemas.openxmlformats.org/drawingml/2006/main" xmlns:r="http://schemas.openxmlformats.org/officeDocument/2006/relationships" xmlns:p="http://schemas.openxmlformats.org/presentationml/2006/main">
+  <p:cSld>
+    <p:spTree>
+      <p:nvGrpSpPr>
+        <p:cNvPr id="1" name="">
+          <a:extLst>
+            <a:ext uri="{FF2B5EF4-FFF2-40B4-BE49-F238E27FC236}">
+              <a16:creationId xmlns:a16="http://schemas.microsoft.com/office/drawing/2014/main" id="{7020ED1D-B804-B8F1-6DB7-6CE72D85D655}"/>
+            </a:ext>
+          </a:extLst>
+        </p:cNvPr>
+        <p:cNvGrpSpPr/>
+        <p:nvPr/>
+      </p:nvGrpSpPr>
+      <p:grpSpPr>
+        <a:xfrm>
+          <a:off x="0" y="0"/>
+          <a:ext cx="0" cy="0"/>
+          <a:chOff x="0" y="0"/>
+          <a:chExt cx="0" cy="0"/>
+        </a:xfrm>
+      </p:grpSpPr>
+      <p:sp>
+        <p:nvSpPr>
           <p:cNvPr id="7" name="Slide Number Placeholder 6">
             <a:extLst>
               <a:ext uri="{FF2B5EF4-FFF2-40B4-BE49-F238E27FC236}">
-                <a16:creationId xmlns:a16="http://schemas.microsoft.com/office/drawing/2014/main" id="{A9439E15-5AE1-CF56-104E-678251CACE6B}"/>
+                <a16:creationId xmlns:a16="http://schemas.microsoft.com/office/drawing/2014/main" id="{A694C37F-EB88-F8AD-A4CD-976F59466D76}"/>
               </a:ext>
             </a:extLst>
           </p:cNvPr>
@@ -5688,8 +5842,8 @@
           <a:lstStyle/>
           <a:p>
             <a:pPr lvl="0"/>
-            <a:fld id="{E7968B7A-83CA-6446-8DC2-C9F0738C6F2A}" type="slidenum">
-              <a:t>47</a:t>
+            <a:fld id="{FDA4B4B5-6CC4-0D46-BA94-EFFB7805E336}" type="slidenum">
+              <a:t>48</a:t>
             </a:fld>
             <a:endParaRPr lang="en-US"/>
           </a:p>
@@ -5700,7 +5854,7 @@
           <p:cNvPr id="2" name="Slide Image Placeholder 1">
             <a:extLst>
               <a:ext uri="{FF2B5EF4-FFF2-40B4-BE49-F238E27FC236}">
-                <a16:creationId xmlns:a16="http://schemas.microsoft.com/office/drawing/2014/main" id="{F60A5FF9-9675-999F-A654-FA872DB469A1}"/>
+                <a16:creationId xmlns:a16="http://schemas.microsoft.com/office/drawing/2014/main" id="{083EA9FC-B268-A86A-56C2-624D6C3ABD16}"/>
               </a:ext>
             </a:extLst>
           </p:cNvPr>
@@ -5732,7 +5886,7 @@
           <p:cNvPr id="3" name="Notes Placeholder 2">
             <a:extLst>
               <a:ext uri="{FF2B5EF4-FFF2-40B4-BE49-F238E27FC236}">
-                <a16:creationId xmlns:a16="http://schemas.microsoft.com/office/drawing/2014/main" id="{E60026CC-DB25-A051-C510-67A5411F0EDF}"/>
+                <a16:creationId xmlns:a16="http://schemas.microsoft.com/office/drawing/2014/main" id="{8805B1E7-7E70-B76E-D33E-F3A13B6C22E2}"/>
               </a:ext>
             </a:extLst>
           </p:cNvPr>
@@ -5753,121 +5907,11 @@
         </p:txBody>
       </p:sp>
     </p:spTree>
-  </p:cSld>
-  <p:clrMapOvr>
-    <a:masterClrMapping/>
-  </p:clrMapOvr>
-</p:notes>
-</file>
-
-<file path=ppt/notesSlides/notesSlide48.xml><?xml version="1.0" encoding="utf-8"?>
-<p:notes xmlns:a="http://schemas.openxmlformats.org/drawingml/2006/main" xmlns:r="http://schemas.openxmlformats.org/officeDocument/2006/relationships" xmlns:p="http://schemas.openxmlformats.org/presentationml/2006/main">
-  <p:cSld>
-    <p:spTree>
-      <p:nvGrpSpPr>
-        <p:cNvPr id="1" name=""/>
-        <p:cNvGrpSpPr/>
-        <p:nvPr/>
-      </p:nvGrpSpPr>
-      <p:grpSpPr>
-        <a:xfrm>
-          <a:off x="0" y="0"/>
-          <a:ext cx="0" cy="0"/>
-          <a:chOff x="0" y="0"/>
-          <a:chExt cx="0" cy="0"/>
-        </a:xfrm>
-      </p:grpSpPr>
-      <p:sp>
-        <p:nvSpPr>
-          <p:cNvPr id="7" name="Slide Number Placeholder 6">
-            <a:extLst>
-              <a:ext uri="{FF2B5EF4-FFF2-40B4-BE49-F238E27FC236}">
-                <a16:creationId xmlns:a16="http://schemas.microsoft.com/office/drawing/2014/main" id="{4512E626-306D-D81B-36FA-50AB9B4F0EF5}"/>
-              </a:ext>
-            </a:extLst>
-          </p:cNvPr>
-          <p:cNvSpPr txBox="1">
-            <a:spLocks noGrp="1"/>
-          </p:cNvSpPr>
-          <p:nvPr>
-            <p:ph type="sldNum" sz="quarter" idx="5"/>
-          </p:nvPr>
-        </p:nvSpPr>
-        <p:spPr>
-          <a:ln/>
-        </p:spPr>
-        <p:txBody>
-          <a:bodyPr lIns="0" tIns="0" rIns="0" bIns="0" anchor="b">
-            <a:noAutofit/>
-          </a:bodyPr>
-          <a:lstStyle/>
-          <a:p>
-            <a:pPr lvl="0"/>
-            <a:fld id="{98A13831-81B1-1A45-94E9-B0BA4DFD727B}" type="slidenum">
-              <a:t>48</a:t>
-            </a:fld>
-            <a:endParaRPr lang="en-US"/>
-          </a:p>
-        </p:txBody>
-      </p:sp>
-      <p:sp>
-        <p:nvSpPr>
-          <p:cNvPr id="2" name="Slide Image Placeholder 1">
-            <a:extLst>
-              <a:ext uri="{FF2B5EF4-FFF2-40B4-BE49-F238E27FC236}">
-                <a16:creationId xmlns:a16="http://schemas.microsoft.com/office/drawing/2014/main" id="{15954B8B-21C9-89DA-9E5D-CE370E477CEE}"/>
-              </a:ext>
-            </a:extLst>
-          </p:cNvPr>
-          <p:cNvSpPr>
-            <a:spLocks noGrp="1" noRot="1" noChangeAspect="1" noResize="1"/>
-          </p:cNvSpPr>
-          <p:nvPr>
-            <p:ph type="sldImg"/>
-          </p:nvPr>
-        </p:nvSpPr>
-        <p:spPr>
-          <a:xfrm>
-            <a:off x="1371600" y="763588"/>
-            <a:ext cx="5029200" cy="3771900"/>
-          </a:xfrm>
-          <a:solidFill>
-            <a:srgbClr val="99CCFF"/>
-          </a:solidFill>
-          <a:ln w="25400">
-            <a:solidFill>
-              <a:srgbClr val="000000"/>
-            </a:solidFill>
-            <a:prstDash val="solid"/>
-          </a:ln>
-        </p:spPr>
-      </p:sp>
-      <p:sp>
-        <p:nvSpPr>
-          <p:cNvPr id="3" name="Notes Placeholder 2">
-            <a:extLst>
-              <a:ext uri="{FF2B5EF4-FFF2-40B4-BE49-F238E27FC236}">
-                <a16:creationId xmlns:a16="http://schemas.microsoft.com/office/drawing/2014/main" id="{DA5FC141-34E8-B24B-8BD1-2DAB8C019081}"/>
-              </a:ext>
-            </a:extLst>
-          </p:cNvPr>
-          <p:cNvSpPr txBox="1">
-            <a:spLocks noGrp="1"/>
-          </p:cNvSpPr>
-          <p:nvPr>
-            <p:ph type="body" sz="quarter" idx="1"/>
-          </p:nvPr>
-        </p:nvSpPr>
-        <p:spPr/>
-        <p:txBody>
-          <a:bodyPr/>
-          <a:lstStyle/>
-          <a:p>
-            <a:endParaRPr lang="en-US"/>
-          </a:p>
-        </p:txBody>
-      </p:sp>
-    </p:spTree>
+    <p:extLst>
+      <p:ext uri="{BB962C8B-B14F-4D97-AF65-F5344CB8AC3E}">
+        <p14:creationId xmlns:p14="http://schemas.microsoft.com/office/powerpoint/2010/main" val="680059037"/>
+      </p:ext>
+    </p:extLst>
   </p:cSld>
   <p:clrMapOvr>
     <a:masterClrMapping/>
@@ -5880,7 +5924,13 @@
   <p:cSld>
     <p:spTree>
       <p:nvGrpSpPr>
-        <p:cNvPr id="1" name=""/>
+        <p:cNvPr id="1" name="">
+          <a:extLst>
+            <a:ext uri="{FF2B5EF4-FFF2-40B4-BE49-F238E27FC236}">
+              <a16:creationId xmlns:a16="http://schemas.microsoft.com/office/drawing/2014/main" id="{DE6F170B-409B-45D8-046F-9B7080CCFFE7}"/>
+            </a:ext>
+          </a:extLst>
+        </p:cNvPr>
         <p:cNvGrpSpPr/>
         <p:nvPr/>
       </p:nvGrpSpPr>
@@ -5894,48 +5944,15 @@
       </p:grpSpPr>
       <p:sp>
         <p:nvSpPr>
-          <p:cNvPr id="7" name="Slide Number Placeholder 6">
-            <a:extLst>
-              <a:ext uri="{FF2B5EF4-FFF2-40B4-BE49-F238E27FC236}">
-                <a16:creationId xmlns:a16="http://schemas.microsoft.com/office/drawing/2014/main" id="{66F631FC-6480-67DE-D9D8-99E23580666D}"/>
-              </a:ext>
-            </a:extLst>
-          </p:cNvPr>
-          <p:cNvSpPr txBox="1">
-            <a:spLocks noGrp="1"/>
-          </p:cNvSpPr>
-          <p:nvPr>
-            <p:ph type="sldNum" sz="quarter" idx="5"/>
-          </p:nvPr>
-        </p:nvSpPr>
-        <p:spPr>
-          <a:ln/>
-        </p:spPr>
-        <p:txBody>
-          <a:bodyPr lIns="0" tIns="0" rIns="0" bIns="0" anchor="b">
-            <a:noAutofit/>
-          </a:bodyPr>
-          <a:lstStyle/>
-          <a:p>
-            <a:pPr lvl="0"/>
-            <a:fld id="{3A58D851-C362-864B-9415-B9BCF2360863}" type="slidenum">
-              <a:t>49</a:t>
-            </a:fld>
-            <a:endParaRPr lang="en-US"/>
-          </a:p>
-        </p:txBody>
-      </p:sp>
-      <p:sp>
-        <p:nvSpPr>
           <p:cNvPr id="2" name="Slide Image Placeholder 1">
             <a:extLst>
               <a:ext uri="{FF2B5EF4-FFF2-40B4-BE49-F238E27FC236}">
-                <a16:creationId xmlns:a16="http://schemas.microsoft.com/office/drawing/2014/main" id="{86D8EFB9-C090-B1FE-A4D3-AB6E47DC0DC1}"/>
+                <a16:creationId xmlns:a16="http://schemas.microsoft.com/office/drawing/2014/main" id="{A3B67E92-143C-5176-C72A-27DB48BC2543}"/>
               </a:ext>
             </a:extLst>
           </p:cNvPr>
           <p:cNvSpPr>
-            <a:spLocks noGrp="1" noRot="1" noChangeAspect="1" noResize="1"/>
+            <a:spLocks noGrp="1" noRot="1" noChangeAspect="1"/>
           </p:cNvSpPr>
           <p:nvPr>
             <p:ph type="sldImg"/>
@@ -5946,15 +5963,6 @@
             <a:off x="1371600" y="763588"/>
             <a:ext cx="5029200" cy="3771900"/>
           </a:xfrm>
-          <a:solidFill>
-            <a:srgbClr val="99CCFF"/>
-          </a:solidFill>
-          <a:ln w="25400">
-            <a:solidFill>
-              <a:srgbClr val="000000"/>
-            </a:solidFill>
-            <a:prstDash val="solid"/>
-          </a:ln>
         </p:spPr>
       </p:sp>
       <p:sp>
@@ -5962,15 +5970,15 @@
           <p:cNvPr id="3" name="Notes Placeholder 2">
             <a:extLst>
               <a:ext uri="{FF2B5EF4-FFF2-40B4-BE49-F238E27FC236}">
-                <a16:creationId xmlns:a16="http://schemas.microsoft.com/office/drawing/2014/main" id="{D930D97A-6DD0-8318-B5EB-4F560AA2DE7C}"/>
-              </a:ext>
-            </a:extLst>
-          </p:cNvPr>
-          <p:cNvSpPr txBox="1">
-            <a:spLocks noGrp="1"/>
-          </p:cNvSpPr>
-          <p:nvPr>
-            <p:ph type="body" sz="quarter" idx="1"/>
+                <a16:creationId xmlns:a16="http://schemas.microsoft.com/office/drawing/2014/main" id="{248FB96C-3E27-80F1-F062-1732724BF876}"/>
+              </a:ext>
+            </a:extLst>
+          </p:cNvPr>
+          <p:cNvSpPr>
+            <a:spLocks noGrp="1"/>
+          </p:cNvSpPr>
+          <p:nvPr>
+            <p:ph type="body" idx="1"/>
           </p:nvPr>
         </p:nvSpPr>
         <p:spPr/>
@@ -5978,11 +5986,57 @@
           <a:bodyPr/>
           <a:lstStyle/>
           <a:p>
+            <a:r>
+              <a:rPr lang="en-US"/>
+              <a:t>Do not modify the notes in this section to avoid tampering with the Poll Everywhere activity.
+More info at polleverywhere.com/support
+What is this instruciton mov ebx, [eax] doing?</a:t>
+            </a:r>
+          </a:p>
+          <a:p>
+            <a:r>
+              <a:rPr lang="en-US"/>
+              <a:t>https://www.polleverywhere.com/multiple_choice_polls/Nu5xKXhHLrsm0NopeA8pm?state=opened&amp;flow=Default&amp;onscreen=persist</a:t>
+            </a:r>
+          </a:p>
+        </p:txBody>
+      </p:sp>
+      <p:sp>
+        <p:nvSpPr>
+          <p:cNvPr id="4" name="Slide Number Placeholder 3">
+            <a:extLst>
+              <a:ext uri="{FF2B5EF4-FFF2-40B4-BE49-F238E27FC236}">
+                <a16:creationId xmlns:a16="http://schemas.microsoft.com/office/drawing/2014/main" id="{F209CF48-EE0D-4567-3040-B4EB4D83BC90}"/>
+              </a:ext>
+            </a:extLst>
+          </p:cNvPr>
+          <p:cNvSpPr>
+            <a:spLocks noGrp="1"/>
+          </p:cNvSpPr>
+          <p:nvPr>
+            <p:ph type="sldNum" sz="quarter" idx="5"/>
+          </p:nvPr>
+        </p:nvSpPr>
+        <p:spPr/>
+        <p:txBody>
+          <a:bodyPr/>
+          <a:lstStyle/>
+          <a:p>
+            <a:pPr lvl="0"/>
+            <a:fld id="{BE166643-42AB-A447-817D-435E25A5F279}" type="slidenum">
+              <a:rPr lang="en-US" smtClean="0"/>
+              <a:t>49</a:t>
+            </a:fld>
             <a:endParaRPr lang="en-US"/>
           </a:p>
         </p:txBody>
       </p:sp>
     </p:spTree>
+    <p:extLst>
+      <p:ext uri="{BB962C8B-B14F-4D97-AF65-F5344CB8AC3E}">
+        <p14:creationId xmlns:p14="http://schemas.microsoft.com/office/powerpoint/2010/main" val="1836629128"/>
+      </p:ext>
+    </p:extLst>
   </p:cSld>
   <p:clrMapOvr>
     <a:masterClrMapping/>
@@ -6110,7 +6164,13 @@
   <p:cSld>
     <p:spTree>
       <p:nvGrpSpPr>
-        <p:cNvPr id="1" name=""/>
+        <p:cNvPr id="1" name="">
+          <a:extLst>
+            <a:ext uri="{FF2B5EF4-FFF2-40B4-BE49-F238E27FC236}">
+              <a16:creationId xmlns:a16="http://schemas.microsoft.com/office/drawing/2014/main" id="{047ECDF2-F07B-4566-182E-21B1B1D5672D}"/>
+            </a:ext>
+          </a:extLst>
+        </p:cNvPr>
         <p:cNvGrpSpPr/>
         <p:nvPr/>
       </p:nvGrpSpPr>
@@ -6127,7 +6187,7 @@
           <p:cNvPr id="7" name="Slide Number Placeholder 6">
             <a:extLst>
               <a:ext uri="{FF2B5EF4-FFF2-40B4-BE49-F238E27FC236}">
-                <a16:creationId xmlns:a16="http://schemas.microsoft.com/office/drawing/2014/main" id="{CD2C7912-E944-2591-14F9-1237D9FE1C3A}"/>
+                <a16:creationId xmlns:a16="http://schemas.microsoft.com/office/drawing/2014/main" id="{09D9C27E-18A7-8235-4351-C80A5179779E}"/>
               </a:ext>
             </a:extLst>
           </p:cNvPr>
@@ -6148,7 +6208,7 @@
           <a:lstStyle/>
           <a:p>
             <a:pPr lvl="0"/>
-            <a:fld id="{25308C66-B0BE-9847-8FD1-86CB5E918AEE}" type="slidenum">
+            <a:fld id="{FDA4B4B5-6CC4-0D46-BA94-EFFB7805E336}" type="slidenum">
               <a:t>50</a:t>
             </a:fld>
             <a:endParaRPr lang="en-US"/>
@@ -6160,7 +6220,7 @@
           <p:cNvPr id="2" name="Slide Image Placeholder 1">
             <a:extLst>
               <a:ext uri="{FF2B5EF4-FFF2-40B4-BE49-F238E27FC236}">
-                <a16:creationId xmlns:a16="http://schemas.microsoft.com/office/drawing/2014/main" id="{7E976C95-E42F-70C9-7973-1FDA6E72AD4A}"/>
+                <a16:creationId xmlns:a16="http://schemas.microsoft.com/office/drawing/2014/main" id="{F85130E4-89B7-8456-5E82-0BFCEEB12D34}"/>
               </a:ext>
             </a:extLst>
           </p:cNvPr>
@@ -6192,7 +6252,7 @@
           <p:cNvPr id="3" name="Notes Placeholder 2">
             <a:extLst>
               <a:ext uri="{FF2B5EF4-FFF2-40B4-BE49-F238E27FC236}">
-                <a16:creationId xmlns:a16="http://schemas.microsoft.com/office/drawing/2014/main" id="{212153B8-59AD-764C-581C-618F83B72313}"/>
+                <a16:creationId xmlns:a16="http://schemas.microsoft.com/office/drawing/2014/main" id="{E150E0F5-8AA3-F71B-87A6-FD834D634A9F}"/>
               </a:ext>
             </a:extLst>
           </p:cNvPr>
@@ -6213,6 +6273,11 @@
         </p:txBody>
       </p:sp>
     </p:spTree>
+    <p:extLst>
+      <p:ext uri="{BB962C8B-B14F-4D97-AF65-F5344CB8AC3E}">
+        <p14:creationId xmlns:p14="http://schemas.microsoft.com/office/powerpoint/2010/main" val="1272775618"/>
+      </p:ext>
+    </p:extLst>
   </p:cSld>
   <p:clrMapOvr>
     <a:masterClrMapping/>
@@ -6225,7 +6290,13 @@
   <p:cSld>
     <p:spTree>
       <p:nvGrpSpPr>
-        <p:cNvPr id="1" name=""/>
+        <p:cNvPr id="1" name="">
+          <a:extLst>
+            <a:ext uri="{FF2B5EF4-FFF2-40B4-BE49-F238E27FC236}">
+              <a16:creationId xmlns:a16="http://schemas.microsoft.com/office/drawing/2014/main" id="{B8659E8C-A41C-3AB0-5F0E-A66A8A161198}"/>
+            </a:ext>
+          </a:extLst>
+        </p:cNvPr>
         <p:cNvGrpSpPr/>
         <p:nvPr/>
       </p:nvGrpSpPr>
@@ -6239,48 +6310,15 @@
       </p:grpSpPr>
       <p:sp>
         <p:nvSpPr>
-          <p:cNvPr id="7" name="Slide Number Placeholder 6">
-            <a:extLst>
-              <a:ext uri="{FF2B5EF4-FFF2-40B4-BE49-F238E27FC236}">
-                <a16:creationId xmlns:a16="http://schemas.microsoft.com/office/drawing/2014/main" id="{ED88BCC0-24AA-6026-2506-37D4C91A41F1}"/>
-              </a:ext>
-            </a:extLst>
-          </p:cNvPr>
-          <p:cNvSpPr txBox="1">
-            <a:spLocks noGrp="1"/>
-          </p:cNvSpPr>
-          <p:nvPr>
-            <p:ph type="sldNum" sz="quarter" idx="5"/>
-          </p:nvPr>
-        </p:nvSpPr>
-        <p:spPr>
-          <a:ln/>
-        </p:spPr>
-        <p:txBody>
-          <a:bodyPr lIns="0" tIns="0" rIns="0" bIns="0" anchor="b">
-            <a:noAutofit/>
-          </a:bodyPr>
-          <a:lstStyle/>
-          <a:p>
-            <a:pPr lvl="0"/>
-            <a:fld id="{014E1FA6-D93C-354B-903C-72F560D61ED8}" type="slidenum">
-              <a:t>51</a:t>
-            </a:fld>
-            <a:endParaRPr lang="en-US"/>
-          </a:p>
-        </p:txBody>
-      </p:sp>
-      <p:sp>
-        <p:nvSpPr>
           <p:cNvPr id="2" name="Slide Image Placeholder 1">
             <a:extLst>
               <a:ext uri="{FF2B5EF4-FFF2-40B4-BE49-F238E27FC236}">
-                <a16:creationId xmlns:a16="http://schemas.microsoft.com/office/drawing/2014/main" id="{DABDC4D5-7278-8B80-A9FD-6784E1127BF7}"/>
+                <a16:creationId xmlns:a16="http://schemas.microsoft.com/office/drawing/2014/main" id="{BA42F6C2-6467-7843-25BE-3D2ED0F52F93}"/>
               </a:ext>
             </a:extLst>
           </p:cNvPr>
           <p:cNvSpPr>
-            <a:spLocks noGrp="1" noRot="1" noChangeAspect="1" noResize="1"/>
+            <a:spLocks noGrp="1" noRot="1" noChangeAspect="1"/>
           </p:cNvSpPr>
           <p:nvPr>
             <p:ph type="sldImg"/>
@@ -6291,15 +6329,6 @@
             <a:off x="1371600" y="763588"/>
             <a:ext cx="5029200" cy="3771900"/>
           </a:xfrm>
-          <a:solidFill>
-            <a:srgbClr val="99CCFF"/>
-          </a:solidFill>
-          <a:ln w="25400">
-            <a:solidFill>
-              <a:srgbClr val="000000"/>
-            </a:solidFill>
-            <a:prstDash val="solid"/>
-          </a:ln>
         </p:spPr>
       </p:sp>
       <p:sp>
@@ -6307,15 +6336,15 @@
           <p:cNvPr id="3" name="Notes Placeholder 2">
             <a:extLst>
               <a:ext uri="{FF2B5EF4-FFF2-40B4-BE49-F238E27FC236}">
-                <a16:creationId xmlns:a16="http://schemas.microsoft.com/office/drawing/2014/main" id="{4EAF801F-C17C-1D65-78E2-578124BBB743}"/>
-              </a:ext>
-            </a:extLst>
-          </p:cNvPr>
-          <p:cNvSpPr txBox="1">
-            <a:spLocks noGrp="1"/>
-          </p:cNvSpPr>
-          <p:nvPr>
-            <p:ph type="body" sz="quarter" idx="1"/>
+                <a16:creationId xmlns:a16="http://schemas.microsoft.com/office/drawing/2014/main" id="{338434EA-48D6-FBA0-D47E-D2D86D61E3E6}"/>
+              </a:ext>
+            </a:extLst>
+          </p:cNvPr>
+          <p:cNvSpPr>
+            <a:spLocks noGrp="1"/>
+          </p:cNvSpPr>
+          <p:nvPr>
+            <p:ph type="body" idx="1"/>
           </p:nvPr>
         </p:nvSpPr>
         <p:spPr/>
@@ -6323,11 +6352,57 @@
           <a:bodyPr/>
           <a:lstStyle/>
           <a:p>
+            <a:r>
+              <a:rPr lang="en-US"/>
+              <a:t>Do not modify the notes in this section to avoid tampering with the Poll Everywhere activity.
+More info at polleverywhere.com/support
+Is this a legal x86 instruction? mov [eax], [ebx]</a:t>
+            </a:r>
+          </a:p>
+          <a:p>
+            <a:r>
+              <a:rPr lang="en-US"/>
+              <a:t>https://www.polleverywhere.com/multiple_choice_polls/kDWvtqhRVLbMKc48fwMVg?state=opened&amp;flow=Default&amp;onscreen=persist</a:t>
+            </a:r>
+          </a:p>
+        </p:txBody>
+      </p:sp>
+      <p:sp>
+        <p:nvSpPr>
+          <p:cNvPr id="4" name="Slide Number Placeholder 3">
+            <a:extLst>
+              <a:ext uri="{FF2B5EF4-FFF2-40B4-BE49-F238E27FC236}">
+                <a16:creationId xmlns:a16="http://schemas.microsoft.com/office/drawing/2014/main" id="{67ADFED1-2346-E96F-628A-80FF6CCBEA72}"/>
+              </a:ext>
+            </a:extLst>
+          </p:cNvPr>
+          <p:cNvSpPr>
+            <a:spLocks noGrp="1"/>
+          </p:cNvSpPr>
+          <p:nvPr>
+            <p:ph type="sldNum" sz="quarter" idx="5"/>
+          </p:nvPr>
+        </p:nvSpPr>
+        <p:spPr/>
+        <p:txBody>
+          <a:bodyPr/>
+          <a:lstStyle/>
+          <a:p>
+            <a:pPr lvl="0"/>
+            <a:fld id="{BE166643-42AB-A447-817D-435E25A5F279}" type="slidenum">
+              <a:rPr lang="en-US" smtClean="0"/>
+              <a:t>51</a:t>
+            </a:fld>
             <a:endParaRPr lang="en-US"/>
           </a:p>
         </p:txBody>
       </p:sp>
     </p:spTree>
+    <p:extLst>
+      <p:ext uri="{BB962C8B-B14F-4D97-AF65-F5344CB8AC3E}">
+        <p14:creationId xmlns:p14="http://schemas.microsoft.com/office/powerpoint/2010/main" val="1586909030"/>
+      </p:ext>
+    </p:extLst>
   </p:cSld>
   <p:clrMapOvr>
     <a:masterClrMapping/>
@@ -6357,7 +6432,7 @@
           <p:cNvPr id="7" name="Slide Number Placeholder 6">
             <a:extLst>
               <a:ext uri="{FF2B5EF4-FFF2-40B4-BE49-F238E27FC236}">
-                <a16:creationId xmlns:a16="http://schemas.microsoft.com/office/drawing/2014/main" id="{ED64A5D3-FC4E-13D7-64DE-BE4CBCE50E59}"/>
+                <a16:creationId xmlns:a16="http://schemas.microsoft.com/office/drawing/2014/main" id="{19DDC3AB-A14D-7C41-B042-E9DFFC1841D3}"/>
               </a:ext>
             </a:extLst>
           </p:cNvPr>
@@ -6378,7 +6453,7 @@
           <a:lstStyle/>
           <a:p>
             <a:pPr lvl="0"/>
-            <a:fld id="{C9AA812B-BD45-E04D-8281-75E6FCAFF195}" type="slidenum">
+            <a:fld id="{729190FF-AE14-1843-A10A-2153921AE1DD}" type="slidenum">
               <a:t>52</a:t>
             </a:fld>
             <a:endParaRPr lang="en-US"/>
@@ -6390,7 +6465,7 @@
           <p:cNvPr id="2" name="Slide Image Placeholder 1">
             <a:extLst>
               <a:ext uri="{FF2B5EF4-FFF2-40B4-BE49-F238E27FC236}">
-                <a16:creationId xmlns:a16="http://schemas.microsoft.com/office/drawing/2014/main" id="{E85991E4-2C32-539C-6DF4-376DF747D12A}"/>
+                <a16:creationId xmlns:a16="http://schemas.microsoft.com/office/drawing/2014/main" id="{CE725A2C-CA39-5EF1-E122-E5E797EBF439}"/>
               </a:ext>
             </a:extLst>
           </p:cNvPr>
@@ -6422,7 +6497,7 @@
           <p:cNvPr id="3" name="Notes Placeholder 2">
             <a:extLst>
               <a:ext uri="{FF2B5EF4-FFF2-40B4-BE49-F238E27FC236}">
-                <a16:creationId xmlns:a16="http://schemas.microsoft.com/office/drawing/2014/main" id="{70627245-777A-58EC-5BB6-8088DBBC09E2}"/>
+                <a16:creationId xmlns:a16="http://schemas.microsoft.com/office/drawing/2014/main" id="{B4503751-86C6-5A6A-E04A-35B803E46A09}"/>
               </a:ext>
             </a:extLst>
           </p:cNvPr>
@@ -6472,7 +6547,7 @@
           <p:cNvPr id="7" name="Slide Number Placeholder 6">
             <a:extLst>
               <a:ext uri="{FF2B5EF4-FFF2-40B4-BE49-F238E27FC236}">
-                <a16:creationId xmlns:a16="http://schemas.microsoft.com/office/drawing/2014/main" id="{2F8F630A-8AD8-4F98-108F-026E2FF17DE6}"/>
+                <a16:creationId xmlns:a16="http://schemas.microsoft.com/office/drawing/2014/main" id="{A9439E15-5AE1-CF56-104E-678251CACE6B}"/>
               </a:ext>
             </a:extLst>
           </p:cNvPr>
@@ -6493,7 +6568,7 @@
           <a:lstStyle/>
           <a:p>
             <a:pPr lvl="0"/>
-            <a:fld id="{2BE26A1E-7063-2E4E-AD69-CFAA62D7E303}" type="slidenum">
+            <a:fld id="{E7968B7A-83CA-6446-8DC2-C9F0738C6F2A}" type="slidenum">
               <a:t>53</a:t>
             </a:fld>
             <a:endParaRPr lang="en-US"/>
@@ -6505,7 +6580,7 @@
           <p:cNvPr id="2" name="Slide Image Placeholder 1">
             <a:extLst>
               <a:ext uri="{FF2B5EF4-FFF2-40B4-BE49-F238E27FC236}">
-                <a16:creationId xmlns:a16="http://schemas.microsoft.com/office/drawing/2014/main" id="{78E1CD85-7DD9-6F1F-D115-67FC86BE4EDC}"/>
+                <a16:creationId xmlns:a16="http://schemas.microsoft.com/office/drawing/2014/main" id="{F60A5FF9-9675-999F-A654-FA872DB469A1}"/>
               </a:ext>
             </a:extLst>
           </p:cNvPr>
@@ -6537,7 +6612,7 @@
           <p:cNvPr id="3" name="Notes Placeholder 2">
             <a:extLst>
               <a:ext uri="{FF2B5EF4-FFF2-40B4-BE49-F238E27FC236}">
-                <a16:creationId xmlns:a16="http://schemas.microsoft.com/office/drawing/2014/main" id="{478FC32E-BD90-BA61-89A7-FE0FD212771F}"/>
+                <a16:creationId xmlns:a16="http://schemas.microsoft.com/office/drawing/2014/main" id="{E60026CC-DB25-A051-C510-67A5411F0EDF}"/>
               </a:ext>
             </a:extLst>
           </p:cNvPr>
@@ -6587,7 +6662,7 @@
           <p:cNvPr id="7" name="Slide Number Placeholder 6">
             <a:extLst>
               <a:ext uri="{FF2B5EF4-FFF2-40B4-BE49-F238E27FC236}">
-                <a16:creationId xmlns:a16="http://schemas.microsoft.com/office/drawing/2014/main" id="{03967C36-2205-A663-DB68-D9AE8BB97C07}"/>
+                <a16:creationId xmlns:a16="http://schemas.microsoft.com/office/drawing/2014/main" id="{4512E626-306D-D81B-36FA-50AB9B4F0EF5}"/>
               </a:ext>
             </a:extLst>
           </p:cNvPr>
@@ -6608,7 +6683,7 @@
           <a:lstStyle/>
           <a:p>
             <a:pPr lvl="0"/>
-            <a:fld id="{B7FC12B9-7FFD-544C-90D3-9BE38B2A3A7A}" type="slidenum">
+            <a:fld id="{98A13831-81B1-1A45-94E9-B0BA4DFD727B}" type="slidenum">
               <a:t>54</a:t>
             </a:fld>
             <a:endParaRPr lang="en-US"/>
@@ -6620,7 +6695,7 @@
           <p:cNvPr id="2" name="Slide Image Placeholder 1">
             <a:extLst>
               <a:ext uri="{FF2B5EF4-FFF2-40B4-BE49-F238E27FC236}">
-                <a16:creationId xmlns:a16="http://schemas.microsoft.com/office/drawing/2014/main" id="{F26152A8-6497-E1AD-B332-9C4715ED9376}"/>
+                <a16:creationId xmlns:a16="http://schemas.microsoft.com/office/drawing/2014/main" id="{15954B8B-21C9-89DA-9E5D-CE370E477CEE}"/>
               </a:ext>
             </a:extLst>
           </p:cNvPr>
@@ -6652,7 +6727,7 @@
           <p:cNvPr id="3" name="Notes Placeholder 2">
             <a:extLst>
               <a:ext uri="{FF2B5EF4-FFF2-40B4-BE49-F238E27FC236}">
-                <a16:creationId xmlns:a16="http://schemas.microsoft.com/office/drawing/2014/main" id="{D6B6C3AB-2AF9-F696-E80A-929F7D0A1D7D}"/>
+                <a16:creationId xmlns:a16="http://schemas.microsoft.com/office/drawing/2014/main" id="{DA5FC141-34E8-B24B-8BD1-2DAB8C019081}"/>
               </a:ext>
             </a:extLst>
           </p:cNvPr>
@@ -6702,7 +6777,7 @@
           <p:cNvPr id="7" name="Slide Number Placeholder 6">
             <a:extLst>
               <a:ext uri="{FF2B5EF4-FFF2-40B4-BE49-F238E27FC236}">
-                <a16:creationId xmlns:a16="http://schemas.microsoft.com/office/drawing/2014/main" id="{335C4D00-0E9A-9670-F092-3CC8EDA6E6A4}"/>
+                <a16:creationId xmlns:a16="http://schemas.microsoft.com/office/drawing/2014/main" id="{66F631FC-6480-67DE-D9D8-99E23580666D}"/>
               </a:ext>
             </a:extLst>
           </p:cNvPr>
@@ -6723,7 +6798,7 @@
           <a:lstStyle/>
           <a:p>
             <a:pPr lvl="0"/>
-            <a:fld id="{DB046654-BFA5-5846-862C-4504817ECCB2}" type="slidenum">
+            <a:fld id="{3A58D851-C362-864B-9415-B9BCF2360863}" type="slidenum">
               <a:t>55</a:t>
             </a:fld>
             <a:endParaRPr lang="en-US"/>
@@ -6735,7 +6810,7 @@
           <p:cNvPr id="2" name="Slide Image Placeholder 1">
             <a:extLst>
               <a:ext uri="{FF2B5EF4-FFF2-40B4-BE49-F238E27FC236}">
-                <a16:creationId xmlns:a16="http://schemas.microsoft.com/office/drawing/2014/main" id="{B8997ED3-8F58-44F3-62DD-8269472935E5}"/>
+                <a16:creationId xmlns:a16="http://schemas.microsoft.com/office/drawing/2014/main" id="{86D8EFB9-C090-B1FE-A4D3-AB6E47DC0DC1}"/>
               </a:ext>
             </a:extLst>
           </p:cNvPr>
@@ -6767,7 +6842,7 @@
           <p:cNvPr id="3" name="Notes Placeholder 2">
             <a:extLst>
               <a:ext uri="{FF2B5EF4-FFF2-40B4-BE49-F238E27FC236}">
-                <a16:creationId xmlns:a16="http://schemas.microsoft.com/office/drawing/2014/main" id="{474F8432-BE09-A790-8F8F-345FF1DC0C56}"/>
+                <a16:creationId xmlns:a16="http://schemas.microsoft.com/office/drawing/2014/main" id="{D930D97A-6DD0-8318-B5EB-4F560AA2DE7C}"/>
               </a:ext>
             </a:extLst>
           </p:cNvPr>
@@ -6817,7 +6892,7 @@
           <p:cNvPr id="7" name="Slide Number Placeholder 6">
             <a:extLst>
               <a:ext uri="{FF2B5EF4-FFF2-40B4-BE49-F238E27FC236}">
-                <a16:creationId xmlns:a16="http://schemas.microsoft.com/office/drawing/2014/main" id="{82438E86-F16F-3ED4-FE94-4581B80F37A8}"/>
+                <a16:creationId xmlns:a16="http://schemas.microsoft.com/office/drawing/2014/main" id="{CD2C7912-E944-2591-14F9-1237D9FE1C3A}"/>
               </a:ext>
             </a:extLst>
           </p:cNvPr>
@@ -6838,7 +6913,7 @@
           <a:lstStyle/>
           <a:p>
             <a:pPr lvl="0"/>
-            <a:fld id="{42FB0490-00D9-1F4E-8B84-29A6667D6C8D}" type="slidenum">
+            <a:fld id="{25308C66-B0BE-9847-8FD1-86CB5E918AEE}" type="slidenum">
               <a:t>56</a:t>
             </a:fld>
             <a:endParaRPr lang="en-US"/>
@@ -6850,7 +6925,7 @@
           <p:cNvPr id="2" name="Slide Image Placeholder 1">
             <a:extLst>
               <a:ext uri="{FF2B5EF4-FFF2-40B4-BE49-F238E27FC236}">
-                <a16:creationId xmlns:a16="http://schemas.microsoft.com/office/drawing/2014/main" id="{CF585EC8-5E96-B50C-C8AE-DCAE0663A574}"/>
+                <a16:creationId xmlns:a16="http://schemas.microsoft.com/office/drawing/2014/main" id="{7E976C95-E42F-70C9-7973-1FDA6E72AD4A}"/>
               </a:ext>
             </a:extLst>
           </p:cNvPr>
@@ -6882,7 +6957,7 @@
           <p:cNvPr id="3" name="Notes Placeholder 2">
             <a:extLst>
               <a:ext uri="{FF2B5EF4-FFF2-40B4-BE49-F238E27FC236}">
-                <a16:creationId xmlns:a16="http://schemas.microsoft.com/office/drawing/2014/main" id="{FC06B973-FA95-9F40-9962-3D6784362E5E}"/>
+                <a16:creationId xmlns:a16="http://schemas.microsoft.com/office/drawing/2014/main" id="{212153B8-59AD-764C-581C-618F83B72313}"/>
               </a:ext>
             </a:extLst>
           </p:cNvPr>
@@ -6932,7 +7007,7 @@
           <p:cNvPr id="7" name="Slide Number Placeholder 6">
             <a:extLst>
               <a:ext uri="{FF2B5EF4-FFF2-40B4-BE49-F238E27FC236}">
-                <a16:creationId xmlns:a16="http://schemas.microsoft.com/office/drawing/2014/main" id="{56D97812-A02A-763A-96DA-0A3F58CFD992}"/>
+                <a16:creationId xmlns:a16="http://schemas.microsoft.com/office/drawing/2014/main" id="{ED88BCC0-24AA-6026-2506-37D4C91A41F1}"/>
               </a:ext>
             </a:extLst>
           </p:cNvPr>
@@ -6953,7 +7028,7 @@
           <a:lstStyle/>
           <a:p>
             <a:pPr lvl="0"/>
-            <a:fld id="{F0E7AEC8-C7BE-564C-91E8-A2474FC0D02D}" type="slidenum">
+            <a:fld id="{014E1FA6-D93C-354B-903C-72F560D61ED8}" type="slidenum">
               <a:t>57</a:t>
             </a:fld>
             <a:endParaRPr lang="en-US"/>
@@ -6965,7 +7040,7 @@
           <p:cNvPr id="2" name="Slide Image Placeholder 1">
             <a:extLst>
               <a:ext uri="{FF2B5EF4-FFF2-40B4-BE49-F238E27FC236}">
-                <a16:creationId xmlns:a16="http://schemas.microsoft.com/office/drawing/2014/main" id="{2C589F69-061A-ECE0-A5CD-95D8BFD4A1E9}"/>
+                <a16:creationId xmlns:a16="http://schemas.microsoft.com/office/drawing/2014/main" id="{DABDC4D5-7278-8B80-A9FD-6784E1127BF7}"/>
               </a:ext>
             </a:extLst>
           </p:cNvPr>
@@ -6997,7 +7072,7 @@
           <p:cNvPr id="3" name="Notes Placeholder 2">
             <a:extLst>
               <a:ext uri="{FF2B5EF4-FFF2-40B4-BE49-F238E27FC236}">
-                <a16:creationId xmlns:a16="http://schemas.microsoft.com/office/drawing/2014/main" id="{ED869D78-9AD9-0371-1835-4D5E44B6C63C}"/>
+                <a16:creationId xmlns:a16="http://schemas.microsoft.com/office/drawing/2014/main" id="{4EAF801F-C17C-1D65-78E2-578124BBB743}"/>
               </a:ext>
             </a:extLst>
           </p:cNvPr>
@@ -7047,7 +7122,7 @@
           <p:cNvPr id="7" name="Slide Number Placeholder 6">
             <a:extLst>
               <a:ext uri="{FF2B5EF4-FFF2-40B4-BE49-F238E27FC236}">
-                <a16:creationId xmlns:a16="http://schemas.microsoft.com/office/drawing/2014/main" id="{8A665678-8D92-852A-AA08-A9297470EDEB}"/>
+                <a16:creationId xmlns:a16="http://schemas.microsoft.com/office/drawing/2014/main" id="{ED64A5D3-FC4E-13D7-64DE-BE4CBCE50E59}"/>
               </a:ext>
             </a:extLst>
           </p:cNvPr>
@@ -7068,7 +7143,7 @@
           <a:lstStyle/>
           <a:p>
             <a:pPr lvl="0"/>
-            <a:fld id="{50E47899-9065-714F-81F8-883E46054218}" type="slidenum">
+            <a:fld id="{C9AA812B-BD45-E04D-8281-75E6FCAFF195}" type="slidenum">
               <a:t>58</a:t>
             </a:fld>
             <a:endParaRPr lang="en-US"/>
@@ -7080,7 +7155,7 @@
           <p:cNvPr id="2" name="Slide Image Placeholder 1">
             <a:extLst>
               <a:ext uri="{FF2B5EF4-FFF2-40B4-BE49-F238E27FC236}">
-                <a16:creationId xmlns:a16="http://schemas.microsoft.com/office/drawing/2014/main" id="{C2EC2A87-AED5-E839-B434-3B75C715872C}"/>
+                <a16:creationId xmlns:a16="http://schemas.microsoft.com/office/drawing/2014/main" id="{E85991E4-2C32-539C-6DF4-376DF747D12A}"/>
               </a:ext>
             </a:extLst>
           </p:cNvPr>
@@ -7112,7 +7187,122 @@
           <p:cNvPr id="3" name="Notes Placeholder 2">
             <a:extLst>
               <a:ext uri="{FF2B5EF4-FFF2-40B4-BE49-F238E27FC236}">
-                <a16:creationId xmlns:a16="http://schemas.microsoft.com/office/drawing/2014/main" id="{09D78B36-65F2-1472-8CB4-535532102E08}"/>
+                <a16:creationId xmlns:a16="http://schemas.microsoft.com/office/drawing/2014/main" id="{70627245-777A-58EC-5BB6-8088DBBC09E2}"/>
+              </a:ext>
+            </a:extLst>
+          </p:cNvPr>
+          <p:cNvSpPr txBox="1">
+            <a:spLocks noGrp="1"/>
+          </p:cNvSpPr>
+          <p:nvPr>
+            <p:ph type="body" sz="quarter" idx="1"/>
+          </p:nvPr>
+        </p:nvSpPr>
+        <p:spPr/>
+        <p:txBody>
+          <a:bodyPr/>
+          <a:lstStyle/>
+          <a:p>
+            <a:endParaRPr lang="en-US"/>
+          </a:p>
+        </p:txBody>
+      </p:sp>
+    </p:spTree>
+  </p:cSld>
+  <p:clrMapOvr>
+    <a:masterClrMapping/>
+  </p:clrMapOvr>
+</p:notes>
+</file>
+
+<file path=ppt/notesSlides/notesSlide59.xml><?xml version="1.0" encoding="utf-8"?>
+<p:notes xmlns:a="http://schemas.openxmlformats.org/drawingml/2006/main" xmlns:r="http://schemas.openxmlformats.org/officeDocument/2006/relationships" xmlns:p="http://schemas.openxmlformats.org/presentationml/2006/main">
+  <p:cSld>
+    <p:spTree>
+      <p:nvGrpSpPr>
+        <p:cNvPr id="1" name=""/>
+        <p:cNvGrpSpPr/>
+        <p:nvPr/>
+      </p:nvGrpSpPr>
+      <p:grpSpPr>
+        <a:xfrm>
+          <a:off x="0" y="0"/>
+          <a:ext cx="0" cy="0"/>
+          <a:chOff x="0" y="0"/>
+          <a:chExt cx="0" cy="0"/>
+        </a:xfrm>
+      </p:grpSpPr>
+      <p:sp>
+        <p:nvSpPr>
+          <p:cNvPr id="7" name="Slide Number Placeholder 6">
+            <a:extLst>
+              <a:ext uri="{FF2B5EF4-FFF2-40B4-BE49-F238E27FC236}">
+                <a16:creationId xmlns:a16="http://schemas.microsoft.com/office/drawing/2014/main" id="{2F8F630A-8AD8-4F98-108F-026E2FF17DE6}"/>
+              </a:ext>
+            </a:extLst>
+          </p:cNvPr>
+          <p:cNvSpPr txBox="1">
+            <a:spLocks noGrp="1"/>
+          </p:cNvSpPr>
+          <p:nvPr>
+            <p:ph type="sldNum" sz="quarter" idx="5"/>
+          </p:nvPr>
+        </p:nvSpPr>
+        <p:spPr>
+          <a:ln/>
+        </p:spPr>
+        <p:txBody>
+          <a:bodyPr lIns="0" tIns="0" rIns="0" bIns="0" anchor="b">
+            <a:noAutofit/>
+          </a:bodyPr>
+          <a:lstStyle/>
+          <a:p>
+            <a:pPr lvl="0"/>
+            <a:fld id="{2BE26A1E-7063-2E4E-AD69-CFAA62D7E303}" type="slidenum">
+              <a:t>59</a:t>
+            </a:fld>
+            <a:endParaRPr lang="en-US"/>
+          </a:p>
+        </p:txBody>
+      </p:sp>
+      <p:sp>
+        <p:nvSpPr>
+          <p:cNvPr id="2" name="Slide Image Placeholder 1">
+            <a:extLst>
+              <a:ext uri="{FF2B5EF4-FFF2-40B4-BE49-F238E27FC236}">
+                <a16:creationId xmlns:a16="http://schemas.microsoft.com/office/drawing/2014/main" id="{78E1CD85-7DD9-6F1F-D115-67FC86BE4EDC}"/>
+              </a:ext>
+            </a:extLst>
+          </p:cNvPr>
+          <p:cNvSpPr>
+            <a:spLocks noGrp="1" noRot="1" noChangeAspect="1" noResize="1"/>
+          </p:cNvSpPr>
+          <p:nvPr>
+            <p:ph type="sldImg"/>
+          </p:nvPr>
+        </p:nvSpPr>
+        <p:spPr>
+          <a:xfrm>
+            <a:off x="1371600" y="763588"/>
+            <a:ext cx="5029200" cy="3771900"/>
+          </a:xfrm>
+          <a:solidFill>
+            <a:srgbClr val="99CCFF"/>
+          </a:solidFill>
+          <a:ln w="25400">
+            <a:solidFill>
+              <a:srgbClr val="000000"/>
+            </a:solidFill>
+            <a:prstDash val="solid"/>
+          </a:ln>
+        </p:spPr>
+      </p:sp>
+      <p:sp>
+        <p:nvSpPr>
+          <p:cNvPr id="3" name="Notes Placeholder 2">
+            <a:extLst>
+              <a:ext uri="{FF2B5EF4-FFF2-40B4-BE49-F238E27FC236}">
+                <a16:creationId xmlns:a16="http://schemas.microsoft.com/office/drawing/2014/main" id="{478FC32E-BD90-BA61-89A7-FE0FD212771F}"/>
               </a:ext>
             </a:extLst>
           </p:cNvPr>
@@ -7228,6 +7418,581 @@
             <a:extLst>
               <a:ext uri="{FF2B5EF4-FFF2-40B4-BE49-F238E27FC236}">
                 <a16:creationId xmlns:a16="http://schemas.microsoft.com/office/drawing/2014/main" id="{4E0DF2AC-CF41-2473-0ECB-FD36EB4FA381}"/>
+              </a:ext>
+            </a:extLst>
+          </p:cNvPr>
+          <p:cNvSpPr txBox="1">
+            <a:spLocks noGrp="1"/>
+          </p:cNvSpPr>
+          <p:nvPr>
+            <p:ph type="body" sz="quarter" idx="1"/>
+          </p:nvPr>
+        </p:nvSpPr>
+        <p:spPr/>
+        <p:txBody>
+          <a:bodyPr/>
+          <a:lstStyle/>
+          <a:p>
+            <a:endParaRPr lang="en-US"/>
+          </a:p>
+        </p:txBody>
+      </p:sp>
+    </p:spTree>
+  </p:cSld>
+  <p:clrMapOvr>
+    <a:masterClrMapping/>
+  </p:clrMapOvr>
+</p:notes>
+</file>
+
+<file path=ppt/notesSlides/notesSlide60.xml><?xml version="1.0" encoding="utf-8"?>
+<p:notes xmlns:a="http://schemas.openxmlformats.org/drawingml/2006/main" xmlns:r="http://schemas.openxmlformats.org/officeDocument/2006/relationships" xmlns:p="http://schemas.openxmlformats.org/presentationml/2006/main">
+  <p:cSld>
+    <p:spTree>
+      <p:nvGrpSpPr>
+        <p:cNvPr id="1" name=""/>
+        <p:cNvGrpSpPr/>
+        <p:nvPr/>
+      </p:nvGrpSpPr>
+      <p:grpSpPr>
+        <a:xfrm>
+          <a:off x="0" y="0"/>
+          <a:ext cx="0" cy="0"/>
+          <a:chOff x="0" y="0"/>
+          <a:chExt cx="0" cy="0"/>
+        </a:xfrm>
+      </p:grpSpPr>
+      <p:sp>
+        <p:nvSpPr>
+          <p:cNvPr id="7" name="Slide Number Placeholder 6">
+            <a:extLst>
+              <a:ext uri="{FF2B5EF4-FFF2-40B4-BE49-F238E27FC236}">
+                <a16:creationId xmlns:a16="http://schemas.microsoft.com/office/drawing/2014/main" id="{03967C36-2205-A663-DB68-D9AE8BB97C07}"/>
+              </a:ext>
+            </a:extLst>
+          </p:cNvPr>
+          <p:cNvSpPr txBox="1">
+            <a:spLocks noGrp="1"/>
+          </p:cNvSpPr>
+          <p:nvPr>
+            <p:ph type="sldNum" sz="quarter" idx="5"/>
+          </p:nvPr>
+        </p:nvSpPr>
+        <p:spPr>
+          <a:ln/>
+        </p:spPr>
+        <p:txBody>
+          <a:bodyPr lIns="0" tIns="0" rIns="0" bIns="0" anchor="b">
+            <a:noAutofit/>
+          </a:bodyPr>
+          <a:lstStyle/>
+          <a:p>
+            <a:pPr lvl="0"/>
+            <a:fld id="{B7FC12B9-7FFD-544C-90D3-9BE38B2A3A7A}" type="slidenum">
+              <a:t>60</a:t>
+            </a:fld>
+            <a:endParaRPr lang="en-US"/>
+          </a:p>
+        </p:txBody>
+      </p:sp>
+      <p:sp>
+        <p:nvSpPr>
+          <p:cNvPr id="2" name="Slide Image Placeholder 1">
+            <a:extLst>
+              <a:ext uri="{FF2B5EF4-FFF2-40B4-BE49-F238E27FC236}">
+                <a16:creationId xmlns:a16="http://schemas.microsoft.com/office/drawing/2014/main" id="{F26152A8-6497-E1AD-B332-9C4715ED9376}"/>
+              </a:ext>
+            </a:extLst>
+          </p:cNvPr>
+          <p:cNvSpPr>
+            <a:spLocks noGrp="1" noRot="1" noChangeAspect="1" noResize="1"/>
+          </p:cNvSpPr>
+          <p:nvPr>
+            <p:ph type="sldImg"/>
+          </p:nvPr>
+        </p:nvSpPr>
+        <p:spPr>
+          <a:xfrm>
+            <a:off x="1371600" y="763588"/>
+            <a:ext cx="5029200" cy="3771900"/>
+          </a:xfrm>
+          <a:solidFill>
+            <a:srgbClr val="99CCFF"/>
+          </a:solidFill>
+          <a:ln w="25400">
+            <a:solidFill>
+              <a:srgbClr val="000000"/>
+            </a:solidFill>
+            <a:prstDash val="solid"/>
+          </a:ln>
+        </p:spPr>
+      </p:sp>
+      <p:sp>
+        <p:nvSpPr>
+          <p:cNvPr id="3" name="Notes Placeholder 2">
+            <a:extLst>
+              <a:ext uri="{FF2B5EF4-FFF2-40B4-BE49-F238E27FC236}">
+                <a16:creationId xmlns:a16="http://schemas.microsoft.com/office/drawing/2014/main" id="{D6B6C3AB-2AF9-F696-E80A-929F7D0A1D7D}"/>
+              </a:ext>
+            </a:extLst>
+          </p:cNvPr>
+          <p:cNvSpPr txBox="1">
+            <a:spLocks noGrp="1"/>
+          </p:cNvSpPr>
+          <p:nvPr>
+            <p:ph type="body" sz="quarter" idx="1"/>
+          </p:nvPr>
+        </p:nvSpPr>
+        <p:spPr/>
+        <p:txBody>
+          <a:bodyPr/>
+          <a:lstStyle/>
+          <a:p>
+            <a:endParaRPr lang="en-US"/>
+          </a:p>
+        </p:txBody>
+      </p:sp>
+    </p:spTree>
+  </p:cSld>
+  <p:clrMapOvr>
+    <a:masterClrMapping/>
+  </p:clrMapOvr>
+</p:notes>
+</file>
+
+<file path=ppt/notesSlides/notesSlide61.xml><?xml version="1.0" encoding="utf-8"?>
+<p:notes xmlns:a="http://schemas.openxmlformats.org/drawingml/2006/main" xmlns:r="http://schemas.openxmlformats.org/officeDocument/2006/relationships" xmlns:p="http://schemas.openxmlformats.org/presentationml/2006/main">
+  <p:cSld>
+    <p:spTree>
+      <p:nvGrpSpPr>
+        <p:cNvPr id="1" name=""/>
+        <p:cNvGrpSpPr/>
+        <p:nvPr/>
+      </p:nvGrpSpPr>
+      <p:grpSpPr>
+        <a:xfrm>
+          <a:off x="0" y="0"/>
+          <a:ext cx="0" cy="0"/>
+          <a:chOff x="0" y="0"/>
+          <a:chExt cx="0" cy="0"/>
+        </a:xfrm>
+      </p:grpSpPr>
+      <p:sp>
+        <p:nvSpPr>
+          <p:cNvPr id="7" name="Slide Number Placeholder 6">
+            <a:extLst>
+              <a:ext uri="{FF2B5EF4-FFF2-40B4-BE49-F238E27FC236}">
+                <a16:creationId xmlns:a16="http://schemas.microsoft.com/office/drawing/2014/main" id="{335C4D00-0E9A-9670-F092-3CC8EDA6E6A4}"/>
+              </a:ext>
+            </a:extLst>
+          </p:cNvPr>
+          <p:cNvSpPr txBox="1">
+            <a:spLocks noGrp="1"/>
+          </p:cNvSpPr>
+          <p:nvPr>
+            <p:ph type="sldNum" sz="quarter" idx="5"/>
+          </p:nvPr>
+        </p:nvSpPr>
+        <p:spPr>
+          <a:ln/>
+        </p:spPr>
+        <p:txBody>
+          <a:bodyPr lIns="0" tIns="0" rIns="0" bIns="0" anchor="b">
+            <a:noAutofit/>
+          </a:bodyPr>
+          <a:lstStyle/>
+          <a:p>
+            <a:pPr lvl="0"/>
+            <a:fld id="{DB046654-BFA5-5846-862C-4504817ECCB2}" type="slidenum">
+              <a:t>61</a:t>
+            </a:fld>
+            <a:endParaRPr lang="en-US"/>
+          </a:p>
+        </p:txBody>
+      </p:sp>
+      <p:sp>
+        <p:nvSpPr>
+          <p:cNvPr id="2" name="Slide Image Placeholder 1">
+            <a:extLst>
+              <a:ext uri="{FF2B5EF4-FFF2-40B4-BE49-F238E27FC236}">
+                <a16:creationId xmlns:a16="http://schemas.microsoft.com/office/drawing/2014/main" id="{B8997ED3-8F58-44F3-62DD-8269472935E5}"/>
+              </a:ext>
+            </a:extLst>
+          </p:cNvPr>
+          <p:cNvSpPr>
+            <a:spLocks noGrp="1" noRot="1" noChangeAspect="1" noResize="1"/>
+          </p:cNvSpPr>
+          <p:nvPr>
+            <p:ph type="sldImg"/>
+          </p:nvPr>
+        </p:nvSpPr>
+        <p:spPr>
+          <a:xfrm>
+            <a:off x="1371600" y="763588"/>
+            <a:ext cx="5029200" cy="3771900"/>
+          </a:xfrm>
+          <a:solidFill>
+            <a:srgbClr val="99CCFF"/>
+          </a:solidFill>
+          <a:ln w="25400">
+            <a:solidFill>
+              <a:srgbClr val="000000"/>
+            </a:solidFill>
+            <a:prstDash val="solid"/>
+          </a:ln>
+        </p:spPr>
+      </p:sp>
+      <p:sp>
+        <p:nvSpPr>
+          <p:cNvPr id="3" name="Notes Placeholder 2">
+            <a:extLst>
+              <a:ext uri="{FF2B5EF4-FFF2-40B4-BE49-F238E27FC236}">
+                <a16:creationId xmlns:a16="http://schemas.microsoft.com/office/drawing/2014/main" id="{474F8432-BE09-A790-8F8F-345FF1DC0C56}"/>
+              </a:ext>
+            </a:extLst>
+          </p:cNvPr>
+          <p:cNvSpPr txBox="1">
+            <a:spLocks noGrp="1"/>
+          </p:cNvSpPr>
+          <p:nvPr>
+            <p:ph type="body" sz="quarter" idx="1"/>
+          </p:nvPr>
+        </p:nvSpPr>
+        <p:spPr/>
+        <p:txBody>
+          <a:bodyPr/>
+          <a:lstStyle/>
+          <a:p>
+            <a:endParaRPr lang="en-US"/>
+          </a:p>
+        </p:txBody>
+      </p:sp>
+    </p:spTree>
+  </p:cSld>
+  <p:clrMapOvr>
+    <a:masterClrMapping/>
+  </p:clrMapOvr>
+</p:notes>
+</file>
+
+<file path=ppt/notesSlides/notesSlide62.xml><?xml version="1.0" encoding="utf-8"?>
+<p:notes xmlns:a="http://schemas.openxmlformats.org/drawingml/2006/main" xmlns:r="http://schemas.openxmlformats.org/officeDocument/2006/relationships" xmlns:p="http://schemas.openxmlformats.org/presentationml/2006/main">
+  <p:cSld>
+    <p:spTree>
+      <p:nvGrpSpPr>
+        <p:cNvPr id="1" name=""/>
+        <p:cNvGrpSpPr/>
+        <p:nvPr/>
+      </p:nvGrpSpPr>
+      <p:grpSpPr>
+        <a:xfrm>
+          <a:off x="0" y="0"/>
+          <a:ext cx="0" cy="0"/>
+          <a:chOff x="0" y="0"/>
+          <a:chExt cx="0" cy="0"/>
+        </a:xfrm>
+      </p:grpSpPr>
+      <p:sp>
+        <p:nvSpPr>
+          <p:cNvPr id="7" name="Slide Number Placeholder 6">
+            <a:extLst>
+              <a:ext uri="{FF2B5EF4-FFF2-40B4-BE49-F238E27FC236}">
+                <a16:creationId xmlns:a16="http://schemas.microsoft.com/office/drawing/2014/main" id="{82438E86-F16F-3ED4-FE94-4581B80F37A8}"/>
+              </a:ext>
+            </a:extLst>
+          </p:cNvPr>
+          <p:cNvSpPr txBox="1">
+            <a:spLocks noGrp="1"/>
+          </p:cNvSpPr>
+          <p:nvPr>
+            <p:ph type="sldNum" sz="quarter" idx="5"/>
+          </p:nvPr>
+        </p:nvSpPr>
+        <p:spPr>
+          <a:ln/>
+        </p:spPr>
+        <p:txBody>
+          <a:bodyPr lIns="0" tIns="0" rIns="0" bIns="0" anchor="b">
+            <a:noAutofit/>
+          </a:bodyPr>
+          <a:lstStyle/>
+          <a:p>
+            <a:pPr lvl="0"/>
+            <a:fld id="{42FB0490-00D9-1F4E-8B84-29A6667D6C8D}" type="slidenum">
+              <a:t>62</a:t>
+            </a:fld>
+            <a:endParaRPr lang="en-US"/>
+          </a:p>
+        </p:txBody>
+      </p:sp>
+      <p:sp>
+        <p:nvSpPr>
+          <p:cNvPr id="2" name="Slide Image Placeholder 1">
+            <a:extLst>
+              <a:ext uri="{FF2B5EF4-FFF2-40B4-BE49-F238E27FC236}">
+                <a16:creationId xmlns:a16="http://schemas.microsoft.com/office/drawing/2014/main" id="{CF585EC8-5E96-B50C-C8AE-DCAE0663A574}"/>
+              </a:ext>
+            </a:extLst>
+          </p:cNvPr>
+          <p:cNvSpPr>
+            <a:spLocks noGrp="1" noRot="1" noChangeAspect="1" noResize="1"/>
+          </p:cNvSpPr>
+          <p:nvPr>
+            <p:ph type="sldImg"/>
+          </p:nvPr>
+        </p:nvSpPr>
+        <p:spPr>
+          <a:xfrm>
+            <a:off x="1371600" y="763588"/>
+            <a:ext cx="5029200" cy="3771900"/>
+          </a:xfrm>
+          <a:solidFill>
+            <a:srgbClr val="99CCFF"/>
+          </a:solidFill>
+          <a:ln w="25400">
+            <a:solidFill>
+              <a:srgbClr val="000000"/>
+            </a:solidFill>
+            <a:prstDash val="solid"/>
+          </a:ln>
+        </p:spPr>
+      </p:sp>
+      <p:sp>
+        <p:nvSpPr>
+          <p:cNvPr id="3" name="Notes Placeholder 2">
+            <a:extLst>
+              <a:ext uri="{FF2B5EF4-FFF2-40B4-BE49-F238E27FC236}">
+                <a16:creationId xmlns:a16="http://schemas.microsoft.com/office/drawing/2014/main" id="{FC06B973-FA95-9F40-9962-3D6784362E5E}"/>
+              </a:ext>
+            </a:extLst>
+          </p:cNvPr>
+          <p:cNvSpPr txBox="1">
+            <a:spLocks noGrp="1"/>
+          </p:cNvSpPr>
+          <p:nvPr>
+            <p:ph type="body" sz="quarter" idx="1"/>
+          </p:nvPr>
+        </p:nvSpPr>
+        <p:spPr/>
+        <p:txBody>
+          <a:bodyPr/>
+          <a:lstStyle/>
+          <a:p>
+            <a:endParaRPr lang="en-US"/>
+          </a:p>
+        </p:txBody>
+      </p:sp>
+    </p:spTree>
+  </p:cSld>
+  <p:clrMapOvr>
+    <a:masterClrMapping/>
+  </p:clrMapOvr>
+</p:notes>
+</file>
+
+<file path=ppt/notesSlides/notesSlide63.xml><?xml version="1.0" encoding="utf-8"?>
+<p:notes xmlns:a="http://schemas.openxmlformats.org/drawingml/2006/main" xmlns:r="http://schemas.openxmlformats.org/officeDocument/2006/relationships" xmlns:p="http://schemas.openxmlformats.org/presentationml/2006/main">
+  <p:cSld>
+    <p:spTree>
+      <p:nvGrpSpPr>
+        <p:cNvPr id="1" name=""/>
+        <p:cNvGrpSpPr/>
+        <p:nvPr/>
+      </p:nvGrpSpPr>
+      <p:grpSpPr>
+        <a:xfrm>
+          <a:off x="0" y="0"/>
+          <a:ext cx="0" cy="0"/>
+          <a:chOff x="0" y="0"/>
+          <a:chExt cx="0" cy="0"/>
+        </a:xfrm>
+      </p:grpSpPr>
+      <p:sp>
+        <p:nvSpPr>
+          <p:cNvPr id="7" name="Slide Number Placeholder 6">
+            <a:extLst>
+              <a:ext uri="{FF2B5EF4-FFF2-40B4-BE49-F238E27FC236}">
+                <a16:creationId xmlns:a16="http://schemas.microsoft.com/office/drawing/2014/main" id="{8A665678-8D92-852A-AA08-A9297470EDEB}"/>
+              </a:ext>
+            </a:extLst>
+          </p:cNvPr>
+          <p:cNvSpPr txBox="1">
+            <a:spLocks noGrp="1"/>
+          </p:cNvSpPr>
+          <p:nvPr>
+            <p:ph type="sldNum" sz="quarter" idx="5"/>
+          </p:nvPr>
+        </p:nvSpPr>
+        <p:spPr>
+          <a:ln/>
+        </p:spPr>
+        <p:txBody>
+          <a:bodyPr lIns="0" tIns="0" rIns="0" bIns="0" anchor="b">
+            <a:noAutofit/>
+          </a:bodyPr>
+          <a:lstStyle/>
+          <a:p>
+            <a:pPr lvl="0"/>
+            <a:fld id="{50E47899-9065-714F-81F8-883E46054218}" type="slidenum">
+              <a:t>63</a:t>
+            </a:fld>
+            <a:endParaRPr lang="en-US"/>
+          </a:p>
+        </p:txBody>
+      </p:sp>
+      <p:sp>
+        <p:nvSpPr>
+          <p:cNvPr id="2" name="Slide Image Placeholder 1">
+            <a:extLst>
+              <a:ext uri="{FF2B5EF4-FFF2-40B4-BE49-F238E27FC236}">
+                <a16:creationId xmlns:a16="http://schemas.microsoft.com/office/drawing/2014/main" id="{C2EC2A87-AED5-E839-B434-3B75C715872C}"/>
+              </a:ext>
+            </a:extLst>
+          </p:cNvPr>
+          <p:cNvSpPr>
+            <a:spLocks noGrp="1" noRot="1" noChangeAspect="1" noResize="1"/>
+          </p:cNvSpPr>
+          <p:nvPr>
+            <p:ph type="sldImg"/>
+          </p:nvPr>
+        </p:nvSpPr>
+        <p:spPr>
+          <a:xfrm>
+            <a:off x="1371600" y="763588"/>
+            <a:ext cx="5029200" cy="3771900"/>
+          </a:xfrm>
+          <a:solidFill>
+            <a:srgbClr val="99CCFF"/>
+          </a:solidFill>
+          <a:ln w="25400">
+            <a:solidFill>
+              <a:srgbClr val="000000"/>
+            </a:solidFill>
+            <a:prstDash val="solid"/>
+          </a:ln>
+        </p:spPr>
+      </p:sp>
+      <p:sp>
+        <p:nvSpPr>
+          <p:cNvPr id="3" name="Notes Placeholder 2">
+            <a:extLst>
+              <a:ext uri="{FF2B5EF4-FFF2-40B4-BE49-F238E27FC236}">
+                <a16:creationId xmlns:a16="http://schemas.microsoft.com/office/drawing/2014/main" id="{09D78B36-65F2-1472-8CB4-535532102E08}"/>
+              </a:ext>
+            </a:extLst>
+          </p:cNvPr>
+          <p:cNvSpPr txBox="1">
+            <a:spLocks noGrp="1"/>
+          </p:cNvSpPr>
+          <p:nvPr>
+            <p:ph type="body" sz="quarter" idx="1"/>
+          </p:nvPr>
+        </p:nvSpPr>
+        <p:spPr/>
+        <p:txBody>
+          <a:bodyPr/>
+          <a:lstStyle/>
+          <a:p>
+            <a:endParaRPr lang="en-US"/>
+          </a:p>
+        </p:txBody>
+      </p:sp>
+    </p:spTree>
+  </p:cSld>
+  <p:clrMapOvr>
+    <a:masterClrMapping/>
+  </p:clrMapOvr>
+</p:notes>
+</file>
+
+<file path=ppt/notesSlides/notesSlide64.xml><?xml version="1.0" encoding="utf-8"?>
+<p:notes xmlns:a="http://schemas.openxmlformats.org/drawingml/2006/main" xmlns:r="http://schemas.openxmlformats.org/officeDocument/2006/relationships" xmlns:p="http://schemas.openxmlformats.org/presentationml/2006/main">
+  <p:cSld>
+    <p:spTree>
+      <p:nvGrpSpPr>
+        <p:cNvPr id="1" name=""/>
+        <p:cNvGrpSpPr/>
+        <p:nvPr/>
+      </p:nvGrpSpPr>
+      <p:grpSpPr>
+        <a:xfrm>
+          <a:off x="0" y="0"/>
+          <a:ext cx="0" cy="0"/>
+          <a:chOff x="0" y="0"/>
+          <a:chExt cx="0" cy="0"/>
+        </a:xfrm>
+      </p:grpSpPr>
+      <p:sp>
+        <p:nvSpPr>
+          <p:cNvPr id="7" name="Slide Number Placeholder 6">
+            <a:extLst>
+              <a:ext uri="{FF2B5EF4-FFF2-40B4-BE49-F238E27FC236}">
+                <a16:creationId xmlns:a16="http://schemas.microsoft.com/office/drawing/2014/main" id="{56D97812-A02A-763A-96DA-0A3F58CFD992}"/>
+              </a:ext>
+            </a:extLst>
+          </p:cNvPr>
+          <p:cNvSpPr txBox="1">
+            <a:spLocks noGrp="1"/>
+          </p:cNvSpPr>
+          <p:nvPr>
+            <p:ph type="sldNum" sz="quarter" idx="5"/>
+          </p:nvPr>
+        </p:nvSpPr>
+        <p:spPr>
+          <a:ln/>
+        </p:spPr>
+        <p:txBody>
+          <a:bodyPr lIns="0" tIns="0" rIns="0" bIns="0" anchor="b">
+            <a:noAutofit/>
+          </a:bodyPr>
+          <a:lstStyle/>
+          <a:p>
+            <a:pPr lvl="0"/>
+            <a:fld id="{F0E7AEC8-C7BE-564C-91E8-A2474FC0D02D}" type="slidenum">
+              <a:t>64</a:t>
+            </a:fld>
+            <a:endParaRPr lang="en-US"/>
+          </a:p>
+        </p:txBody>
+      </p:sp>
+      <p:sp>
+        <p:nvSpPr>
+          <p:cNvPr id="2" name="Slide Image Placeholder 1">
+            <a:extLst>
+              <a:ext uri="{FF2B5EF4-FFF2-40B4-BE49-F238E27FC236}">
+                <a16:creationId xmlns:a16="http://schemas.microsoft.com/office/drawing/2014/main" id="{2C589F69-061A-ECE0-A5CD-95D8BFD4A1E9}"/>
+              </a:ext>
+            </a:extLst>
+          </p:cNvPr>
+          <p:cNvSpPr>
+            <a:spLocks noGrp="1" noRot="1" noChangeAspect="1" noResize="1"/>
+          </p:cNvSpPr>
+          <p:nvPr>
+            <p:ph type="sldImg"/>
+          </p:nvPr>
+        </p:nvSpPr>
+        <p:spPr>
+          <a:xfrm>
+            <a:off x="1371600" y="763588"/>
+            <a:ext cx="5029200" cy="3771900"/>
+          </a:xfrm>
+          <a:solidFill>
+            <a:srgbClr val="99CCFF"/>
+          </a:solidFill>
+          <a:ln w="25400">
+            <a:solidFill>
+              <a:srgbClr val="000000"/>
+            </a:solidFill>
+            <a:prstDash val="solid"/>
+          </a:ln>
+        </p:spPr>
+      </p:sp>
+      <p:sp>
+        <p:nvSpPr>
+          <p:cNvPr id="3" name="Notes Placeholder 2">
+            <a:extLst>
+              <a:ext uri="{FF2B5EF4-FFF2-40B4-BE49-F238E27FC236}">
+                <a16:creationId xmlns:a16="http://schemas.microsoft.com/office/drawing/2014/main" id="{ED869D78-9AD9-0371-1835-4D5E44B6C63C}"/>
               </a:ext>
             </a:extLst>
           </p:cNvPr>
@@ -18118,10 +18883,10 @@
       </p:pic>
       <p:pic>
         <p:nvPicPr>
-          <p:cNvPr id="5" name="Picture 235">
-            <a:extLst>
-              <a:ext uri="{FF2B5EF4-FFF2-40B4-BE49-F238E27FC236}">
-                <a16:creationId xmlns:a16="http://schemas.microsoft.com/office/drawing/2014/main" id="{2C5CEF10-13B6-5CEA-1D47-06B09CEFC522}"/>
+          <p:cNvPr id="6" name="Picture 5">
+            <a:extLst>
+              <a:ext uri="{FF2B5EF4-FFF2-40B4-BE49-F238E27FC236}">
+                <a16:creationId xmlns:a16="http://schemas.microsoft.com/office/drawing/2014/main" id="{F80CB4A6-971C-2488-F8DE-AA7FA1EE672F}"/>
               </a:ext>
             </a:extLst>
           </p:cNvPr>
@@ -18131,41 +18896,7 @@
           <p:nvPr/>
         </p:nvPicPr>
         <p:blipFill>
-          <a:blip r:embed="rId5"/>
-          <a:stretch>
-            <a:fillRect/>
-          </a:stretch>
-        </p:blipFill>
-        <p:spPr>
-          <a:xfrm>
-            <a:off x="6171480" y="1652400"/>
-            <a:ext cx="804240" cy="1355760"/>
-          </a:xfrm>
-          <a:prstGeom prst="rect">
-            <a:avLst/>
-          </a:prstGeom>
-          <a:noFill/>
-          <a:ln>
-            <a:noFill/>
-          </a:ln>
-        </p:spPr>
-      </p:pic>
-      <p:pic>
-        <p:nvPicPr>
-          <p:cNvPr id="6" name="Picture 5">
-            <a:extLst>
-              <a:ext uri="{FF2B5EF4-FFF2-40B4-BE49-F238E27FC236}">
-                <a16:creationId xmlns:a16="http://schemas.microsoft.com/office/drawing/2014/main" id="{F80CB4A6-971C-2488-F8DE-AA7FA1EE672F}"/>
-              </a:ext>
-            </a:extLst>
-          </p:cNvPr>
-          <p:cNvPicPr>
-            <a:picLocks noChangeAspect="1"/>
-          </p:cNvPicPr>
-          <p:nvPr/>
-        </p:nvPicPr>
-        <p:blipFill>
-          <a:blip r:embed="rId6">
+          <a:blip r:embed="rId5">
             <a:lum/>
             <a:alphaModFix/>
           </a:blip>
@@ -18193,189 +18924,6 @@
   <p:clrMapOvr>
     <a:masterClrMapping/>
   </p:clrMapOvr>
-  <p:timing>
-    <p:tnLst>
-      <p:par>
-        <p:cTn id="1" dur="indefinite" restart="never" nodeType="tmRoot">
-          <p:childTnLst>
-            <p:seq concurrent="1" nextAc="seek">
-              <p:cTn id="2" dur="indefinite" nodeType="mainSeq">
-                <p:childTnLst>
-                  <p:par>
-                    <p:cTn id="3" fill="hold">
-                      <p:stCondLst>
-                        <p:cond delay="indefinite"/>
-                      </p:stCondLst>
-                      <p:childTnLst>
-                        <p:par>
-                          <p:cTn id="4" fill="hold">
-                            <p:stCondLst>
-                              <p:cond delay="0"/>
-                            </p:stCondLst>
-                            <p:childTnLst>
-                              <p:par>
-                                <p:cTn id="5" presetClass="entr" fill="hold" nodeType="clickEffect">
-                                  <p:stCondLst>
-                                    <p:cond delay="0"/>
-                                  </p:stCondLst>
-                                  <p:childTnLst>
-                                    <p:set>
-                                      <p:cBhvr>
-                                        <p:cTn id="6" dur="1" fill="hold">
-                                          <p:stCondLst>
-                                            <p:cond delay="0"/>
-                                          </p:stCondLst>
-                                        </p:cTn>
-                                        <p:tgtEl>
-                                          <p:spTgt spid="3"/>
-                                        </p:tgtEl>
-                                        <p:attrNameLst>
-                                          <p:attrName>style.visibility</p:attrName>
-                                        </p:attrNameLst>
-                                      </p:cBhvr>
-                                      <p:to>
-                                        <p:strVal val="visible"/>
-                                      </p:to>
-                                    </p:set>
-                                  </p:childTnLst>
-                                </p:cTn>
-                              </p:par>
-                              <p:par>
-                                <p:cTn id="7" presetClass="entr" fill="hold" nodeType="withEffect">
-                                  <p:stCondLst>
-                                    <p:cond delay="0"/>
-                                  </p:stCondLst>
-                                  <p:childTnLst>
-                                    <p:set>
-                                      <p:cBhvr>
-                                        <p:cTn id="8" dur="1" fill="hold">
-                                          <p:stCondLst>
-                                            <p:cond delay="0"/>
-                                          </p:stCondLst>
-                                        </p:cTn>
-                                        <p:tgtEl>
-                                          <p:spTgt spid="5"/>
-                                        </p:tgtEl>
-                                        <p:attrNameLst>
-                                          <p:attrName>style.visibility</p:attrName>
-                                        </p:attrNameLst>
-                                      </p:cBhvr>
-                                      <p:to>
-                                        <p:strVal val="visible"/>
-                                      </p:to>
-                                    </p:set>
-                                  </p:childTnLst>
-                                </p:cTn>
-                              </p:par>
-                              <p:par>
-                                <p:cTn id="9" presetClass="exit" fill="hold" nodeType="withEffect">
-                                  <p:stCondLst>
-                                    <p:cond delay="0"/>
-                                  </p:stCondLst>
-                                  <p:childTnLst>
-                                    <p:set>
-                                      <p:cBhvr>
-                                        <p:cTn id="10" dur="1" fill="hold">
-                                          <p:stCondLst>
-                                            <p:cond delay="0"/>
-                                          </p:stCondLst>
-                                        </p:cTn>
-                                        <p:tgtEl>
-                                          <p:spTgt spid="6"/>
-                                        </p:tgtEl>
-                                        <p:attrNameLst>
-                                          <p:attrName>style.visibility</p:attrName>
-                                        </p:attrNameLst>
-                                      </p:cBhvr>
-                                      <p:to>
-                                        <p:strVal val="hidden"/>
-                                      </p:to>
-                                    </p:set>
-                                  </p:childTnLst>
-                                </p:cTn>
-                              </p:par>
-                              <p:par>
-                                <p:cTn id="11" presetClass="exit" fill="hold" nodeType="withEffect">
-                                  <p:stCondLst>
-                                    <p:cond delay="0"/>
-                                  </p:stCondLst>
-                                  <p:childTnLst>
-                                    <p:set>
-                                      <p:cBhvr>
-                                        <p:cTn id="12" dur="1" fill="hold">
-                                          <p:stCondLst>
-                                            <p:cond delay="0"/>
-                                          </p:stCondLst>
-                                        </p:cTn>
-                                        <p:tgtEl>
-                                          <p:spTgt spid="3"/>
-                                        </p:tgtEl>
-                                        <p:attrNameLst>
-                                          <p:attrName>style.visibility</p:attrName>
-                                        </p:attrNameLst>
-                                      </p:cBhvr>
-                                      <p:to>
-                                        <p:strVal val="hidden"/>
-                                      </p:to>
-                                    </p:set>
-                                  </p:childTnLst>
-                                </p:cTn>
-                              </p:par>
-                              <p:par>
-                                <p:cTn id="13" presetClass="exit" fill="hold" nodeType="withEffect">
-                                  <p:stCondLst>
-                                    <p:cond delay="0"/>
-                                  </p:stCondLst>
-                                  <p:childTnLst>
-                                    <p:set>
-                                      <p:cBhvr>
-                                        <p:cTn id="14" dur="1" fill="hold">
-                                          <p:stCondLst>
-                                            <p:cond delay="0"/>
-                                          </p:stCondLst>
-                                        </p:cTn>
-                                        <p:tgtEl>
-                                          <p:spTgt spid="5"/>
-                                        </p:tgtEl>
-                                        <p:attrNameLst>
-                                          <p:attrName>style.visibility</p:attrName>
-                                        </p:attrNameLst>
-                                      </p:cBhvr>
-                                      <p:to>
-                                        <p:strVal val="hidden"/>
-                                      </p:to>
-                                    </p:set>
-                                  </p:childTnLst>
-                                </p:cTn>
-                              </p:par>
-                            </p:childTnLst>
-                          </p:cTn>
-                        </p:par>
-                      </p:childTnLst>
-                    </p:cTn>
-                  </p:par>
-                </p:childTnLst>
-              </p:cTn>
-              <p:prevCondLst>
-                <p:cond evt="onPrev" delay="0">
-                  <p:tgtEl>
-                    <p:sldTgt/>
-                  </p:tgtEl>
-                </p:cond>
-              </p:prevCondLst>
-              <p:nextCondLst>
-                <p:cond evt="onNext" delay="0">
-                  <p:tgtEl>
-                    <p:sldTgt/>
-                  </p:tgtEl>
-                </p:cond>
-              </p:nextCondLst>
-            </p:seq>
-          </p:childTnLst>
-        </p:cTn>
-      </p:par>
-    </p:tnLst>
-  </p:timing>
 </p:sld>
 </file>
 
@@ -21831,7 +22379,22 @@
               <a:rPr lang="en-US" sz="3200" dirty="0">
                 <a:latin typeface="Liberation Sans" pitchFamily="34"/>
               </a:rPr>
-              <a:t>This instruction is equivalent to the sub instruction, except the result of the subtraction is discarded instead of replacing the first operand.</a:t>
+              <a:t>This instruction is equivalent to the </a:t>
+            </a:r>
+            <a:r>
+              <a:rPr lang="en-US" sz="3200" dirty="0">
+                <a:solidFill>
+                  <a:srgbClr val="0070C0"/>
+                </a:solidFill>
+                <a:latin typeface="Liberation Sans" pitchFamily="34"/>
+              </a:rPr>
+              <a:t>sub</a:t>
+            </a:r>
+            <a:r>
+              <a:rPr lang="en-US" sz="3200" dirty="0">
+                <a:latin typeface="Liberation Sans" pitchFamily="34"/>
+              </a:rPr>
+              <a:t> instruction, except the result of the subtraction is discarded instead of replacing the first operand.</a:t>
             </a:r>
           </a:p>
           <a:p>
@@ -22125,6 +22688,1328 @@
 </file>
 
 <file path=ppt/slides/slide46.xml><?xml version="1.0" encoding="utf-8"?>
+<p:sld xmlns:a="http://schemas.openxmlformats.org/drawingml/2006/main" xmlns:r="http://schemas.openxmlformats.org/officeDocument/2006/relationships" xmlns:p="http://schemas.openxmlformats.org/presentationml/2006/main">
+  <p:cSld>
+    <p:spTree>
+      <p:nvGrpSpPr>
+        <p:cNvPr id="1" name="">
+          <a:extLst>
+            <a:ext uri="{FF2B5EF4-FFF2-40B4-BE49-F238E27FC236}">
+              <a16:creationId xmlns:a16="http://schemas.microsoft.com/office/drawing/2014/main" id="{D87AA414-BC84-F69A-6FBC-105AD4F2D303}"/>
+            </a:ext>
+          </a:extLst>
+        </p:cNvPr>
+        <p:cNvGrpSpPr/>
+        <p:nvPr/>
+      </p:nvGrpSpPr>
+      <p:grpSpPr>
+        <a:xfrm>
+          <a:off x="0" y="0"/>
+          <a:ext cx="0" cy="0"/>
+          <a:chOff x="0" y="0"/>
+          <a:chExt cx="0" cy="0"/>
+        </a:xfrm>
+      </p:grpSpPr>
+      <p:sp>
+        <p:nvSpPr>
+          <p:cNvPr id="2" name="Title 1">
+            <a:extLst>
+              <a:ext uri="{FF2B5EF4-FFF2-40B4-BE49-F238E27FC236}">
+                <a16:creationId xmlns:a16="http://schemas.microsoft.com/office/drawing/2014/main" id="{C786E882-F8CE-B564-36F6-65BB94FE9DA0}"/>
+              </a:ext>
+            </a:extLst>
+          </p:cNvPr>
+          <p:cNvSpPr txBox="1">
+            <a:spLocks noGrp="1"/>
+          </p:cNvSpPr>
+          <p:nvPr>
+            <p:ph type="title" idx="4294967295"/>
+          </p:nvPr>
+        </p:nvSpPr>
+        <p:spPr/>
+        <p:txBody>
+          <a:bodyPr/>
+          <a:lstStyle/>
+          <a:p>
+            <a:pPr lvl="0"/>
+            <a:r>
+              <a:rPr lang="en-US" dirty="0"/>
+              <a:t>Poll Q1: What is inside </a:t>
+            </a:r>
+            <a:r>
+              <a:rPr lang="en-US" dirty="0" err="1"/>
+              <a:t>ebx</a:t>
+            </a:r>
+            <a:r>
+              <a:rPr lang="en-US" dirty="0"/>
+              <a:t>?</a:t>
+            </a:r>
+          </a:p>
+        </p:txBody>
+      </p:sp>
+      <p:sp>
+        <p:nvSpPr>
+          <p:cNvPr id="3" name="Text Placeholder 2">
+            <a:extLst>
+              <a:ext uri="{FF2B5EF4-FFF2-40B4-BE49-F238E27FC236}">
+                <a16:creationId xmlns:a16="http://schemas.microsoft.com/office/drawing/2014/main" id="{B03DC98F-EDB7-421A-CC4E-B903F5757407}"/>
+              </a:ext>
+            </a:extLst>
+          </p:cNvPr>
+          <p:cNvSpPr txBox="1">
+            <a:spLocks noGrp="1"/>
+          </p:cNvSpPr>
+          <p:nvPr>
+            <p:ph type="body" idx="4294967295"/>
+          </p:nvPr>
+        </p:nvSpPr>
+        <p:spPr>
+          <a:xfrm>
+            <a:off x="503999" y="1769040"/>
+            <a:ext cx="9071640" cy="5088960"/>
+          </a:xfrm>
+        </p:spPr>
+        <p:txBody>
+          <a:bodyPr>
+            <a:normAutofit/>
+          </a:bodyPr>
+          <a:lstStyle/>
+          <a:p>
+            <a:pPr marL="457200" lvl="0" indent="-457200">
+              <a:buSzPct val="100000"/>
+              <a:buFont typeface="Arial" panose="020B0604020202020204" pitchFamily="34" charset="0"/>
+              <a:buChar char="•"/>
+            </a:pPr>
+            <a:r>
+              <a:rPr lang="en-US" dirty="0"/>
+              <a:t>After we execute the mov instruction?</a:t>
+            </a:r>
+            <a:endParaRPr lang="en-US" dirty="0">
+              <a:solidFill>
+                <a:srgbClr val="1B75BC"/>
+              </a:solidFill>
+            </a:endParaRPr>
+          </a:p>
+          <a:p>
+            <a:pPr lvl="0"/>
+            <a:r>
+              <a:rPr lang="en-US" sz="2400" dirty="0">
+                <a:solidFill>
+                  <a:schemeClr val="accent6">
+                    <a:lumMod val="75000"/>
+                  </a:schemeClr>
+                </a:solidFill>
+                <a:latin typeface="FiraMono Nerd Font Mono" panose="020B0509050000020004" pitchFamily="49" charset="0"/>
+                <a:ea typeface="FiraMono Nerd Font Mono" panose="020B0509050000020004" pitchFamily="49" charset="0"/>
+              </a:rPr>
+              <a:t>; </a:t>
+            </a:r>
+            <a:r>
+              <a:rPr lang="en-US" sz="2400" dirty="0" err="1">
+                <a:solidFill>
+                  <a:schemeClr val="accent6">
+                    <a:lumMod val="75000"/>
+                  </a:schemeClr>
+                </a:solidFill>
+                <a:latin typeface="FiraMono Nerd Font Mono" panose="020B0509050000020004" pitchFamily="49" charset="0"/>
+                <a:ea typeface="FiraMono Nerd Font Mono" panose="020B0509050000020004" pitchFamily="49" charset="0"/>
+              </a:rPr>
+              <a:t>eax</a:t>
+            </a:r>
+            <a:r>
+              <a:rPr lang="en-US" sz="2400" dirty="0">
+                <a:solidFill>
+                  <a:schemeClr val="accent6">
+                    <a:lumMod val="75000"/>
+                  </a:schemeClr>
+                </a:solidFill>
+                <a:latin typeface="FiraMono Nerd Font Mono" panose="020B0509050000020004" pitchFamily="49" charset="0"/>
+                <a:ea typeface="FiraMono Nerd Font Mono" panose="020B0509050000020004" pitchFamily="49" charset="0"/>
+              </a:rPr>
+              <a:t> = 2</a:t>
+            </a:r>
+          </a:p>
+          <a:p>
+            <a:pPr lvl="0"/>
+            <a:r>
+              <a:rPr lang="en-US" sz="2400" dirty="0">
+                <a:solidFill>
+                  <a:schemeClr val="accent6">
+                    <a:lumMod val="75000"/>
+                  </a:schemeClr>
+                </a:solidFill>
+                <a:latin typeface="FiraMono Nerd Font Mono" panose="020B0509050000020004" pitchFamily="49" charset="0"/>
+                <a:ea typeface="FiraMono Nerd Font Mono" panose="020B0509050000020004" pitchFamily="49" charset="0"/>
+              </a:rPr>
+              <a:t>; </a:t>
+            </a:r>
+            <a:r>
+              <a:rPr lang="en-US" sz="2400" dirty="0" err="1">
+                <a:solidFill>
+                  <a:schemeClr val="accent6">
+                    <a:lumMod val="75000"/>
+                  </a:schemeClr>
+                </a:solidFill>
+                <a:latin typeface="FiraMono Nerd Font Mono" panose="020B0509050000020004" pitchFamily="49" charset="0"/>
+                <a:ea typeface="FiraMono Nerd Font Mono" panose="020B0509050000020004" pitchFamily="49" charset="0"/>
+              </a:rPr>
+              <a:t>ebx</a:t>
+            </a:r>
+            <a:r>
+              <a:rPr lang="en-US" sz="2400" dirty="0">
+                <a:solidFill>
+                  <a:schemeClr val="accent6">
+                    <a:lumMod val="75000"/>
+                  </a:schemeClr>
+                </a:solidFill>
+                <a:latin typeface="FiraMono Nerd Font Mono" panose="020B0509050000020004" pitchFamily="49" charset="0"/>
+                <a:ea typeface="FiraMono Nerd Font Mono" panose="020B0509050000020004" pitchFamily="49" charset="0"/>
+              </a:rPr>
+              <a:t> = 3</a:t>
+            </a:r>
+          </a:p>
+          <a:p>
+            <a:pPr lvl="0"/>
+            <a:r>
+              <a:rPr lang="en-US" sz="2400" dirty="0">
+                <a:solidFill>
+                  <a:srgbClr val="94476B"/>
+                </a:solidFill>
+                <a:latin typeface="FiraMono Nerd Font Mono" panose="020B0509050000020004" pitchFamily="49" charset="0"/>
+                <a:ea typeface="FiraMono Nerd Font Mono" panose="020B0509050000020004" pitchFamily="49" charset="0"/>
+              </a:rPr>
+              <a:t>mov </a:t>
+            </a:r>
+            <a:r>
+              <a:rPr lang="en-US" sz="2400" dirty="0" err="1">
+                <a:solidFill>
+                  <a:srgbClr val="94476B"/>
+                </a:solidFill>
+                <a:latin typeface="FiraMono Nerd Font Mono" panose="020B0509050000020004" pitchFamily="49" charset="0"/>
+                <a:ea typeface="FiraMono Nerd Font Mono" panose="020B0509050000020004" pitchFamily="49" charset="0"/>
+              </a:rPr>
+              <a:t>ebx</a:t>
+            </a:r>
+            <a:r>
+              <a:rPr lang="en-US" sz="2400" dirty="0">
+                <a:solidFill>
+                  <a:srgbClr val="94476B"/>
+                </a:solidFill>
+                <a:latin typeface="FiraMono Nerd Font Mono" panose="020B0509050000020004" pitchFamily="49" charset="0"/>
+                <a:ea typeface="FiraMono Nerd Font Mono" panose="020B0509050000020004" pitchFamily="49" charset="0"/>
+              </a:rPr>
+              <a:t>, </a:t>
+            </a:r>
+            <a:r>
+              <a:rPr lang="en-US" sz="2400" dirty="0" err="1">
+                <a:solidFill>
+                  <a:srgbClr val="94476B"/>
+                </a:solidFill>
+                <a:latin typeface="FiraMono Nerd Font Mono" panose="020B0509050000020004" pitchFamily="49" charset="0"/>
+                <a:ea typeface="FiraMono Nerd Font Mono" panose="020B0509050000020004" pitchFamily="49" charset="0"/>
+              </a:rPr>
+              <a:t>eax</a:t>
+            </a:r>
+            <a:r>
+              <a:rPr lang="en-US" sz="2400" dirty="0">
+                <a:solidFill>
+                  <a:srgbClr val="94476B"/>
+                </a:solidFill>
+                <a:latin typeface="FiraMono Nerd Font Mono" panose="020B0509050000020004" pitchFamily="49" charset="0"/>
+                <a:ea typeface="FiraMono Nerd Font Mono" panose="020B0509050000020004" pitchFamily="49" charset="0"/>
+              </a:rPr>
+              <a:t> </a:t>
+            </a:r>
+          </a:p>
+          <a:p>
+            <a:pPr lvl="0"/>
+            <a:r>
+              <a:rPr lang="en-US" sz="2400" dirty="0">
+                <a:solidFill>
+                  <a:schemeClr val="accent6">
+                    <a:lumMod val="75000"/>
+                  </a:schemeClr>
+                </a:solidFill>
+                <a:latin typeface="FiraMono Nerd Font Mono" panose="020B0509050000020004" pitchFamily="49" charset="0"/>
+                <a:ea typeface="FiraMono Nerd Font Mono" panose="020B0509050000020004" pitchFamily="49" charset="0"/>
+              </a:rPr>
+              <a:t>; what is the value of </a:t>
+            </a:r>
+            <a:r>
+              <a:rPr lang="en-US" sz="2400" dirty="0" err="1">
+                <a:solidFill>
+                  <a:schemeClr val="accent6">
+                    <a:lumMod val="75000"/>
+                  </a:schemeClr>
+                </a:solidFill>
+                <a:latin typeface="FiraMono Nerd Font Mono" panose="020B0509050000020004" pitchFamily="49" charset="0"/>
+                <a:ea typeface="FiraMono Nerd Font Mono" panose="020B0509050000020004" pitchFamily="49" charset="0"/>
+              </a:rPr>
+              <a:t>ebx</a:t>
+            </a:r>
+            <a:r>
+              <a:rPr lang="en-US" sz="2400" dirty="0">
+                <a:solidFill>
+                  <a:schemeClr val="accent6">
+                    <a:lumMod val="75000"/>
+                  </a:schemeClr>
+                </a:solidFill>
+                <a:latin typeface="FiraMono Nerd Font Mono" panose="020B0509050000020004" pitchFamily="49" charset="0"/>
+                <a:ea typeface="FiraMono Nerd Font Mono" panose="020B0509050000020004" pitchFamily="49" charset="0"/>
+              </a:rPr>
+              <a:t> here? </a:t>
+            </a:r>
+            <a:endParaRPr lang="en-US" sz="2600" dirty="0">
+              <a:solidFill>
+                <a:schemeClr val="accent6">
+                  <a:lumMod val="75000"/>
+                </a:schemeClr>
+              </a:solidFill>
+              <a:latin typeface="FiraMono Nerd Font Mono" panose="020B0509050000020004" pitchFamily="49" charset="0"/>
+              <a:ea typeface="FiraMono Nerd Font Mono" panose="020B0509050000020004" pitchFamily="49" charset="0"/>
+            </a:endParaRPr>
+          </a:p>
+        </p:txBody>
+      </p:sp>
+      <p:pic>
+        <p:nvPicPr>
+          <p:cNvPr id="4" name="Picture 3">
+            <a:extLst>
+              <a:ext uri="{FF2B5EF4-FFF2-40B4-BE49-F238E27FC236}">
+                <a16:creationId xmlns:a16="http://schemas.microsoft.com/office/drawing/2014/main" id="{2E0679AA-58C0-0DF2-C16C-E541400F23CB}"/>
+              </a:ext>
+            </a:extLst>
+          </p:cNvPr>
+          <p:cNvPicPr>
+            <a:picLocks noChangeAspect="1"/>
+          </p:cNvPicPr>
+          <p:nvPr/>
+        </p:nvPicPr>
+        <p:blipFill>
+          <a:blip r:embed="rId3"/>
+          <a:stretch>
+            <a:fillRect/>
+          </a:stretch>
+        </p:blipFill>
+        <p:spPr>
+          <a:xfrm>
+            <a:off x="6944809" y="4413068"/>
+            <a:ext cx="2543556" cy="2543556"/>
+          </a:xfrm>
+          <a:prstGeom prst="rect">
+            <a:avLst/>
+          </a:prstGeom>
+        </p:spPr>
+      </p:pic>
+    </p:spTree>
+    <p:extLst>
+      <p:ext uri="{BB962C8B-B14F-4D97-AF65-F5344CB8AC3E}">
+        <p14:creationId xmlns:p14="http://schemas.microsoft.com/office/powerpoint/2010/main" val="190352960"/>
+      </p:ext>
+    </p:extLst>
+  </p:cSld>
+  <p:clrMapOvr>
+    <a:masterClrMapping/>
+  </p:clrMapOvr>
+</p:sld>
+</file>
+
+<file path=ppt/slides/slide47.xml><?xml version="1.0" encoding="utf-8"?>
+<p:sld xmlns:a="http://schemas.openxmlformats.org/drawingml/2006/main" xmlns:r="http://schemas.openxmlformats.org/officeDocument/2006/relationships" xmlns:p="http://schemas.openxmlformats.org/presentationml/2006/main">
+  <p:cSld>
+    <p:spTree>
+      <p:nvGrpSpPr>
+        <p:cNvPr id="1" name="">
+          <a:extLst>
+            <a:ext uri="{FF2B5EF4-FFF2-40B4-BE49-F238E27FC236}">
+              <a16:creationId xmlns:a16="http://schemas.microsoft.com/office/drawing/2014/main" id="{3C4967DC-5AFD-53DB-291D-4D28B4101100}"/>
+            </a:ext>
+          </a:extLst>
+        </p:cNvPr>
+        <p:cNvGrpSpPr/>
+        <p:nvPr/>
+      </p:nvGrpSpPr>
+      <p:grpSpPr>
+        <a:xfrm>
+          <a:off x="0" y="0"/>
+          <a:ext cx="0" cy="0"/>
+          <a:chOff x="0" y="0"/>
+          <a:chExt cx="0" cy="0"/>
+        </a:xfrm>
+      </p:grpSpPr>
+      <p:sp>
+        <p:nvSpPr>
+          <p:cNvPr id="2" name="Title 1">
+            <a:extLst>
+              <a:ext uri="{FF2B5EF4-FFF2-40B4-BE49-F238E27FC236}">
+                <a16:creationId xmlns:a16="http://schemas.microsoft.com/office/drawing/2014/main" id="{998C93C7-37DE-28EC-9FFE-C5B51A8562F2}"/>
+              </a:ext>
+            </a:extLst>
+          </p:cNvPr>
+          <p:cNvSpPr>
+            <a:spLocks noGrp="1"/>
+          </p:cNvSpPr>
+          <p:nvPr>
+            <p:ph type="ctrTitle"/>
+          </p:nvPr>
+        </p:nvSpPr>
+        <p:spPr/>
+        <p:txBody>
+          <a:bodyPr/>
+          <a:lstStyle/>
+          <a:p>
+            <a:endParaRPr lang="en-US"/>
+          </a:p>
+        </p:txBody>
+      </p:sp>
+      <p:sp>
+        <p:nvSpPr>
+          <p:cNvPr id="3" name="Subtitle 2">
+            <a:extLst>
+              <a:ext uri="{FF2B5EF4-FFF2-40B4-BE49-F238E27FC236}">
+                <a16:creationId xmlns:a16="http://schemas.microsoft.com/office/drawing/2014/main" id="{3FFB8512-459E-2B29-A5FF-88B84552B3BD}"/>
+              </a:ext>
+            </a:extLst>
+          </p:cNvPr>
+          <p:cNvSpPr>
+            <a:spLocks noGrp="1"/>
+          </p:cNvSpPr>
+          <p:nvPr>
+            <p:ph type="subTitle" idx="1"/>
+          </p:nvPr>
+        </p:nvSpPr>
+        <p:spPr/>
+        <p:txBody>
+          <a:bodyPr/>
+          <a:lstStyle/>
+          <a:p>
+            <a:endParaRPr lang="en-US"/>
+          </a:p>
+        </p:txBody>
+      </p:sp>
+      <p:pic>
+        <p:nvPicPr>
+          <p:cNvPr id="5" name="slide.url=https://www.polleverywhere.com/multiple_choice_polls/lrCccnGm68FB3B7E5O6Sj?state=opened&amp;flow=Default&amp;onscreen=persist">
+            <a:extLst>
+              <a:ext uri="{FF2B5EF4-FFF2-40B4-BE49-F238E27FC236}">
+                <a16:creationId xmlns:a16="http://schemas.microsoft.com/office/drawing/2014/main" id="{F18A81E8-17C1-70A1-D3EB-612B95404197}"/>
+              </a:ext>
+            </a:extLst>
+          </p:cNvPr>
+          <p:cNvPicPr>
+            <a:picLocks/>
+          </p:cNvPicPr>
+          <p:nvPr/>
+        </p:nvPicPr>
+        <p:blipFill>
+          <a:blip r:embed="rId3"/>
+          <a:stretch>
+            <a:fillRect/>
+          </a:stretch>
+        </p:blipFill>
+        <p:spPr>
+          <a:xfrm>
+            <a:off x="63500" y="63500"/>
+            <a:ext cx="9953625" cy="7432675"/>
+          </a:xfrm>
+          <a:prstGeom prst="rect">
+            <a:avLst/>
+          </a:prstGeom>
+        </p:spPr>
+      </p:pic>
+    </p:spTree>
+    <p:extLst>
+      <p:ext uri="{BB962C8B-B14F-4D97-AF65-F5344CB8AC3E}">
+        <p14:creationId xmlns:p14="http://schemas.microsoft.com/office/powerpoint/2010/main" val="1657597861"/>
+      </p:ext>
+    </p:extLst>
+  </p:cSld>
+  <p:clrMapOvr>
+    <a:masterClrMapping/>
+  </p:clrMapOvr>
+</p:sld>
+</file>
+
+<file path=ppt/slides/slide48.xml><?xml version="1.0" encoding="utf-8"?>
+<p:sld xmlns:a="http://schemas.openxmlformats.org/drawingml/2006/main" xmlns:r="http://schemas.openxmlformats.org/officeDocument/2006/relationships" xmlns:p="http://schemas.openxmlformats.org/presentationml/2006/main">
+  <p:cSld>
+    <p:spTree>
+      <p:nvGrpSpPr>
+        <p:cNvPr id="1" name="">
+          <a:extLst>
+            <a:ext uri="{FF2B5EF4-FFF2-40B4-BE49-F238E27FC236}">
+              <a16:creationId xmlns:a16="http://schemas.microsoft.com/office/drawing/2014/main" id="{CE225CA9-EB4F-899C-760B-53F1BC64A461}"/>
+            </a:ext>
+          </a:extLst>
+        </p:cNvPr>
+        <p:cNvGrpSpPr/>
+        <p:nvPr/>
+      </p:nvGrpSpPr>
+      <p:grpSpPr>
+        <a:xfrm>
+          <a:off x="0" y="0"/>
+          <a:ext cx="0" cy="0"/>
+          <a:chOff x="0" y="0"/>
+          <a:chExt cx="0" cy="0"/>
+        </a:xfrm>
+      </p:grpSpPr>
+      <p:sp>
+        <p:nvSpPr>
+          <p:cNvPr id="2" name="Title 1">
+            <a:extLst>
+              <a:ext uri="{FF2B5EF4-FFF2-40B4-BE49-F238E27FC236}">
+                <a16:creationId xmlns:a16="http://schemas.microsoft.com/office/drawing/2014/main" id="{42F1A7A0-BC68-E1FA-20EA-3B8114A4CDB7}"/>
+              </a:ext>
+            </a:extLst>
+          </p:cNvPr>
+          <p:cNvSpPr txBox="1">
+            <a:spLocks noGrp="1"/>
+          </p:cNvSpPr>
+          <p:nvPr>
+            <p:ph type="title" idx="4294967295"/>
+          </p:nvPr>
+        </p:nvSpPr>
+        <p:spPr/>
+        <p:txBody>
+          <a:bodyPr/>
+          <a:lstStyle/>
+          <a:p>
+            <a:pPr lvl="0"/>
+            <a:r>
+              <a:rPr lang="en-US" dirty="0"/>
+              <a:t>Poll Q2: What is this instruction doing?</a:t>
+            </a:r>
+          </a:p>
+        </p:txBody>
+      </p:sp>
+      <p:sp>
+        <p:nvSpPr>
+          <p:cNvPr id="3" name="Text Placeholder 2">
+            <a:extLst>
+              <a:ext uri="{FF2B5EF4-FFF2-40B4-BE49-F238E27FC236}">
+                <a16:creationId xmlns:a16="http://schemas.microsoft.com/office/drawing/2014/main" id="{89D22403-81A8-1411-1954-E24F84845257}"/>
+              </a:ext>
+            </a:extLst>
+          </p:cNvPr>
+          <p:cNvSpPr txBox="1">
+            <a:spLocks noGrp="1"/>
+          </p:cNvSpPr>
+          <p:nvPr>
+            <p:ph type="body" idx="4294967295"/>
+          </p:nvPr>
+        </p:nvSpPr>
+        <p:spPr>
+          <a:xfrm>
+            <a:off x="503999" y="1769040"/>
+            <a:ext cx="9071640" cy="5088960"/>
+          </a:xfrm>
+        </p:spPr>
+        <p:txBody>
+          <a:bodyPr>
+            <a:normAutofit/>
+          </a:bodyPr>
+          <a:lstStyle/>
+          <a:p>
+            <a:pPr lvl="0"/>
+            <a:r>
+              <a:rPr lang="en-US" sz="2400" dirty="0">
+                <a:solidFill>
+                  <a:srgbClr val="94476B"/>
+                </a:solidFill>
+                <a:latin typeface="FiraMono Nerd Font Mono" panose="020B0509050000020004" pitchFamily="49" charset="0"/>
+                <a:ea typeface="FiraMono Nerd Font Mono" panose="020B0509050000020004" pitchFamily="49" charset="0"/>
+              </a:rPr>
+              <a:t>mov </a:t>
+            </a:r>
+            <a:r>
+              <a:rPr lang="en-US" sz="2400" dirty="0" err="1">
+                <a:solidFill>
+                  <a:srgbClr val="94476B"/>
+                </a:solidFill>
+                <a:latin typeface="FiraMono Nerd Font Mono" panose="020B0509050000020004" pitchFamily="49" charset="0"/>
+                <a:ea typeface="FiraMono Nerd Font Mono" panose="020B0509050000020004" pitchFamily="49" charset="0"/>
+              </a:rPr>
+              <a:t>ebx</a:t>
+            </a:r>
+            <a:r>
+              <a:rPr lang="en-US" sz="2400" dirty="0">
+                <a:solidFill>
+                  <a:srgbClr val="94476B"/>
+                </a:solidFill>
+                <a:latin typeface="FiraMono Nerd Font Mono" panose="020B0509050000020004" pitchFamily="49" charset="0"/>
+                <a:ea typeface="FiraMono Nerd Font Mono" panose="020B0509050000020004" pitchFamily="49" charset="0"/>
+              </a:rPr>
+              <a:t>, [</a:t>
+            </a:r>
+            <a:r>
+              <a:rPr lang="en-US" sz="2400" dirty="0" err="1">
+                <a:solidFill>
+                  <a:srgbClr val="94476B"/>
+                </a:solidFill>
+                <a:latin typeface="FiraMono Nerd Font Mono" panose="020B0509050000020004" pitchFamily="49" charset="0"/>
+                <a:ea typeface="FiraMono Nerd Font Mono" panose="020B0509050000020004" pitchFamily="49" charset="0"/>
+              </a:rPr>
+              <a:t>eax</a:t>
+            </a:r>
+            <a:r>
+              <a:rPr lang="en-US" sz="2400" dirty="0">
+                <a:solidFill>
+                  <a:srgbClr val="94476B"/>
+                </a:solidFill>
+                <a:latin typeface="FiraMono Nerd Font Mono" panose="020B0509050000020004" pitchFamily="49" charset="0"/>
+                <a:ea typeface="FiraMono Nerd Font Mono" panose="020B0509050000020004" pitchFamily="49" charset="0"/>
+              </a:rPr>
+              <a:t>] </a:t>
+            </a:r>
+          </a:p>
+          <a:p>
+            <a:pPr lvl="0"/>
+            <a:r>
+              <a:rPr lang="en-US" sz="2400" dirty="0">
+                <a:solidFill>
+                  <a:schemeClr val="accent6">
+                    <a:lumMod val="75000"/>
+                  </a:schemeClr>
+                </a:solidFill>
+                <a:latin typeface="FiraMono Nerd Font Mono" panose="020B0509050000020004" pitchFamily="49" charset="0"/>
+                <a:ea typeface="FiraMono Nerd Font Mono" panose="020B0509050000020004" pitchFamily="49" charset="0"/>
+              </a:rPr>
+              <a:t>; Is it writing memory? Or reading it?</a:t>
+            </a:r>
+            <a:endParaRPr lang="en-US" sz="2600" dirty="0">
+              <a:solidFill>
+                <a:schemeClr val="accent6">
+                  <a:lumMod val="75000"/>
+                </a:schemeClr>
+              </a:solidFill>
+              <a:latin typeface="FiraMono Nerd Font Mono" panose="020B0509050000020004" pitchFamily="49" charset="0"/>
+              <a:ea typeface="FiraMono Nerd Font Mono" panose="020B0509050000020004" pitchFamily="49" charset="0"/>
+            </a:endParaRPr>
+          </a:p>
+        </p:txBody>
+      </p:sp>
+    </p:spTree>
+    <p:extLst>
+      <p:ext uri="{BB962C8B-B14F-4D97-AF65-F5344CB8AC3E}">
+        <p14:creationId xmlns:p14="http://schemas.microsoft.com/office/powerpoint/2010/main" val="3688077688"/>
+      </p:ext>
+    </p:extLst>
+  </p:cSld>
+  <p:clrMapOvr>
+    <a:masterClrMapping/>
+  </p:clrMapOvr>
+</p:sld>
+</file>
+
+<file path=ppt/slides/slide49.xml><?xml version="1.0" encoding="utf-8"?>
+<p:sld xmlns:a="http://schemas.openxmlformats.org/drawingml/2006/main" xmlns:r="http://schemas.openxmlformats.org/officeDocument/2006/relationships" xmlns:p="http://schemas.openxmlformats.org/presentationml/2006/main">
+  <p:cSld>
+    <p:spTree>
+      <p:nvGrpSpPr>
+        <p:cNvPr id="1" name="">
+          <a:extLst>
+            <a:ext uri="{FF2B5EF4-FFF2-40B4-BE49-F238E27FC236}">
+              <a16:creationId xmlns:a16="http://schemas.microsoft.com/office/drawing/2014/main" id="{2FD624A6-9192-3004-8053-6D01D7D900EE}"/>
+            </a:ext>
+          </a:extLst>
+        </p:cNvPr>
+        <p:cNvGrpSpPr/>
+        <p:nvPr/>
+      </p:nvGrpSpPr>
+      <p:grpSpPr>
+        <a:xfrm>
+          <a:off x="0" y="0"/>
+          <a:ext cx="0" cy="0"/>
+          <a:chOff x="0" y="0"/>
+          <a:chExt cx="0" cy="0"/>
+        </a:xfrm>
+      </p:grpSpPr>
+      <p:sp>
+        <p:nvSpPr>
+          <p:cNvPr id="2" name="Title 1">
+            <a:extLst>
+              <a:ext uri="{FF2B5EF4-FFF2-40B4-BE49-F238E27FC236}">
+                <a16:creationId xmlns:a16="http://schemas.microsoft.com/office/drawing/2014/main" id="{0846F9EA-938D-2BA5-3910-56FF83B0C48F}"/>
+              </a:ext>
+            </a:extLst>
+          </p:cNvPr>
+          <p:cNvSpPr>
+            <a:spLocks noGrp="1"/>
+          </p:cNvSpPr>
+          <p:nvPr>
+            <p:ph type="ctrTitle"/>
+          </p:nvPr>
+        </p:nvSpPr>
+        <p:spPr/>
+        <p:txBody>
+          <a:bodyPr/>
+          <a:lstStyle/>
+          <a:p>
+            <a:endParaRPr lang="en-US"/>
+          </a:p>
+        </p:txBody>
+      </p:sp>
+      <p:sp>
+        <p:nvSpPr>
+          <p:cNvPr id="3" name="Subtitle 2">
+            <a:extLst>
+              <a:ext uri="{FF2B5EF4-FFF2-40B4-BE49-F238E27FC236}">
+                <a16:creationId xmlns:a16="http://schemas.microsoft.com/office/drawing/2014/main" id="{70190DA5-1464-F1FE-8FEF-E5B7C05EF9DD}"/>
+              </a:ext>
+            </a:extLst>
+          </p:cNvPr>
+          <p:cNvSpPr>
+            <a:spLocks noGrp="1"/>
+          </p:cNvSpPr>
+          <p:nvPr>
+            <p:ph type="subTitle" idx="1"/>
+          </p:nvPr>
+        </p:nvSpPr>
+        <p:spPr/>
+        <p:txBody>
+          <a:bodyPr/>
+          <a:lstStyle/>
+          <a:p>
+            <a:endParaRPr lang="en-US"/>
+          </a:p>
+        </p:txBody>
+      </p:sp>
+      <p:pic>
+        <p:nvPicPr>
+          <p:cNvPr id="5" name="slide.url=https://www.polleverywhere.com/multiple_choice_polls/Nu5xKXhHLrsm0NopeA8pm?state=opened&amp;flow=Default&amp;onscreen=persist">
+            <a:extLst>
+              <a:ext uri="{FF2B5EF4-FFF2-40B4-BE49-F238E27FC236}">
+                <a16:creationId xmlns:a16="http://schemas.microsoft.com/office/drawing/2014/main" id="{E8EFB721-8872-FD80-7C9D-33B679D97D05}"/>
+              </a:ext>
+            </a:extLst>
+          </p:cNvPr>
+          <p:cNvPicPr>
+            <a:picLocks/>
+          </p:cNvPicPr>
+          <p:nvPr/>
+        </p:nvPicPr>
+        <p:blipFill>
+          <a:blip r:embed="rId3"/>
+          <a:stretch>
+            <a:fillRect/>
+          </a:stretch>
+        </p:blipFill>
+        <p:spPr>
+          <a:xfrm>
+            <a:off x="63500" y="63500"/>
+            <a:ext cx="9953625" cy="7432675"/>
+          </a:xfrm>
+          <a:prstGeom prst="rect">
+            <a:avLst/>
+          </a:prstGeom>
+        </p:spPr>
+      </p:pic>
+    </p:spTree>
+    <p:extLst>
+      <p:ext uri="{BB962C8B-B14F-4D97-AF65-F5344CB8AC3E}">
+        <p14:creationId xmlns:p14="http://schemas.microsoft.com/office/powerpoint/2010/main" val="1120350569"/>
+      </p:ext>
+    </p:extLst>
+  </p:cSld>
+  <p:clrMapOvr>
+    <a:masterClrMapping/>
+  </p:clrMapOvr>
+</p:sld>
+</file>
+
+<file path=ppt/slides/slide5.xml><?xml version="1.0" encoding="utf-8"?>
+<p:sld xmlns:a="http://schemas.openxmlformats.org/drawingml/2006/main" xmlns:r="http://schemas.openxmlformats.org/officeDocument/2006/relationships" xmlns:p="http://schemas.openxmlformats.org/presentationml/2006/main">
+  <p:cSld name="page5">
+    <p:spTree>
+      <p:nvGrpSpPr>
+        <p:cNvPr id="1" name=""/>
+        <p:cNvGrpSpPr/>
+        <p:nvPr/>
+      </p:nvGrpSpPr>
+      <p:grpSpPr>
+        <a:xfrm>
+          <a:off x="0" y="0"/>
+          <a:ext cx="0" cy="0"/>
+          <a:chOff x="0" y="0"/>
+          <a:chExt cx="0" cy="0"/>
+        </a:xfrm>
+      </p:grpSpPr>
+      <p:sp>
+        <p:nvSpPr>
+          <p:cNvPr id="5" name="Subtitle 1">
+            <a:extLst>
+              <a:ext uri="{FF2B5EF4-FFF2-40B4-BE49-F238E27FC236}">
+                <a16:creationId xmlns:a16="http://schemas.microsoft.com/office/drawing/2014/main" id="{4E479181-EE76-8E7F-7A49-66062E672BB4}"/>
+              </a:ext>
+            </a:extLst>
+          </p:cNvPr>
+          <p:cNvSpPr txBox="1">
+            <a:spLocks/>
+          </p:cNvSpPr>
+          <p:nvPr/>
+        </p:nvSpPr>
+        <p:spPr>
+          <a:xfrm>
+            <a:off x="504492" y="1085091"/>
+            <a:ext cx="9071640" cy="5851800"/>
+          </a:xfrm>
+          <a:prstGeom prst="rect">
+            <a:avLst/>
+          </a:prstGeom>
+          <a:noFill/>
+          <a:ln>
+            <a:noFill/>
+          </a:ln>
+        </p:spPr>
+        <p:txBody>
+          <a:bodyPr lIns="0" tIns="0" rIns="0" bIns="0" anchor="ctr">
+            <a:normAutofit fontScale="92500" lnSpcReduction="10000"/>
+          </a:bodyPr>
+          <a:lstStyle>
+            <a:lvl1pPr marL="0" marR="0" indent="0" hangingPunct="0">
+              <a:spcBef>
+                <a:spcPts val="0"/>
+              </a:spcBef>
+              <a:spcAft>
+                <a:spcPts val="1414"/>
+              </a:spcAft>
+              <a:tabLst/>
+              <a:defRPr lang="en-US" sz="3200" b="0" i="0" u="none" strike="noStrike" kern="1200">
+                <a:ln>
+                  <a:noFill/>
+                </a:ln>
+                <a:latin typeface="Liberation Sans" pitchFamily="18"/>
+              </a:defRPr>
+            </a:lvl1pPr>
+            <a:lvl2pPr marL="685800" indent="-228600" algn="l" defTabSz="914400" rtl="0" eaLnBrk="1" latinLnBrk="0" hangingPunct="1">
+              <a:lnSpc>
+                <a:spcPct val="90000"/>
+              </a:lnSpc>
+              <a:spcBef>
+                <a:spcPts val="500"/>
+              </a:spcBef>
+              <a:buFont typeface="Arial" panose="020B0604020202020204" pitchFamily="34" charset="0"/>
+              <a:buChar char="•"/>
+              <a:defRPr sz="2400" kern="1200">
+                <a:solidFill>
+                  <a:schemeClr val="tx1"/>
+                </a:solidFill>
+                <a:latin typeface="+mn-lt"/>
+                <a:ea typeface="+mn-ea"/>
+                <a:cs typeface="+mn-cs"/>
+              </a:defRPr>
+            </a:lvl2pPr>
+            <a:lvl3pPr marL="1143000" indent="-228600" algn="l" defTabSz="914400" rtl="0" eaLnBrk="1" latinLnBrk="0" hangingPunct="1">
+              <a:lnSpc>
+                <a:spcPct val="90000"/>
+              </a:lnSpc>
+              <a:spcBef>
+                <a:spcPts val="500"/>
+              </a:spcBef>
+              <a:buFont typeface="Arial" panose="020B0604020202020204" pitchFamily="34" charset="0"/>
+              <a:buChar char="•"/>
+              <a:defRPr sz="2000" kern="1200">
+                <a:solidFill>
+                  <a:schemeClr val="tx1"/>
+                </a:solidFill>
+                <a:latin typeface="+mn-lt"/>
+                <a:ea typeface="+mn-ea"/>
+                <a:cs typeface="+mn-cs"/>
+              </a:defRPr>
+            </a:lvl3pPr>
+            <a:lvl4pPr marL="1600200" indent="-228600" algn="l" defTabSz="914400" rtl="0" eaLnBrk="1" latinLnBrk="0" hangingPunct="1">
+              <a:lnSpc>
+                <a:spcPct val="90000"/>
+              </a:lnSpc>
+              <a:spcBef>
+                <a:spcPts val="500"/>
+              </a:spcBef>
+              <a:buFont typeface="Arial" panose="020B0604020202020204" pitchFamily="34" charset="0"/>
+              <a:buChar char="•"/>
+              <a:defRPr sz="1800" kern="1200">
+                <a:solidFill>
+                  <a:schemeClr val="tx1"/>
+                </a:solidFill>
+                <a:latin typeface="+mn-lt"/>
+                <a:ea typeface="+mn-ea"/>
+                <a:cs typeface="+mn-cs"/>
+              </a:defRPr>
+            </a:lvl4pPr>
+            <a:lvl5pPr marL="2057400" indent="-228600" algn="l" defTabSz="914400" rtl="0" eaLnBrk="1" latinLnBrk="0" hangingPunct="1">
+              <a:lnSpc>
+                <a:spcPct val="90000"/>
+              </a:lnSpc>
+              <a:spcBef>
+                <a:spcPts val="500"/>
+              </a:spcBef>
+              <a:buFont typeface="Arial" panose="020B0604020202020204" pitchFamily="34" charset="0"/>
+              <a:buChar char="•"/>
+              <a:defRPr sz="1800" kern="1200">
+                <a:solidFill>
+                  <a:schemeClr val="tx1"/>
+                </a:solidFill>
+                <a:latin typeface="+mn-lt"/>
+                <a:ea typeface="+mn-ea"/>
+                <a:cs typeface="+mn-cs"/>
+              </a:defRPr>
+            </a:lvl5pPr>
+            <a:lvl6pPr marL="2514600" indent="-228600" algn="l" defTabSz="914400" rtl="0" eaLnBrk="1" latinLnBrk="0" hangingPunct="1">
+              <a:lnSpc>
+                <a:spcPct val="90000"/>
+              </a:lnSpc>
+              <a:spcBef>
+                <a:spcPts val="500"/>
+              </a:spcBef>
+              <a:buFont typeface="Arial" panose="020B0604020202020204" pitchFamily="34" charset="0"/>
+              <a:buChar char="•"/>
+              <a:defRPr sz="1800" kern="1200">
+                <a:solidFill>
+                  <a:schemeClr val="tx1"/>
+                </a:solidFill>
+                <a:latin typeface="+mn-lt"/>
+                <a:ea typeface="+mn-ea"/>
+                <a:cs typeface="+mn-cs"/>
+              </a:defRPr>
+            </a:lvl6pPr>
+            <a:lvl7pPr marL="2971800" indent="-228600" algn="l" defTabSz="914400" rtl="0" eaLnBrk="1" latinLnBrk="0" hangingPunct="1">
+              <a:lnSpc>
+                <a:spcPct val="90000"/>
+              </a:lnSpc>
+              <a:spcBef>
+                <a:spcPts val="500"/>
+              </a:spcBef>
+              <a:buFont typeface="Arial" panose="020B0604020202020204" pitchFamily="34" charset="0"/>
+              <a:buChar char="•"/>
+              <a:defRPr sz="1800" kern="1200">
+                <a:solidFill>
+                  <a:schemeClr val="tx1"/>
+                </a:solidFill>
+                <a:latin typeface="+mn-lt"/>
+                <a:ea typeface="+mn-ea"/>
+                <a:cs typeface="+mn-cs"/>
+              </a:defRPr>
+            </a:lvl7pPr>
+            <a:lvl8pPr marL="3429000" indent="-228600" algn="l" defTabSz="914400" rtl="0" eaLnBrk="1" latinLnBrk="0" hangingPunct="1">
+              <a:lnSpc>
+                <a:spcPct val="90000"/>
+              </a:lnSpc>
+              <a:spcBef>
+                <a:spcPts val="500"/>
+              </a:spcBef>
+              <a:buFont typeface="Arial" panose="020B0604020202020204" pitchFamily="34" charset="0"/>
+              <a:buChar char="•"/>
+              <a:defRPr sz="1800" kern="1200">
+                <a:solidFill>
+                  <a:schemeClr val="tx1"/>
+                </a:solidFill>
+                <a:latin typeface="+mn-lt"/>
+                <a:ea typeface="+mn-ea"/>
+                <a:cs typeface="+mn-cs"/>
+              </a:defRPr>
+            </a:lvl8pPr>
+            <a:lvl9pPr marL="3886200" indent="-228600" algn="l" defTabSz="914400" rtl="0" eaLnBrk="1" latinLnBrk="0" hangingPunct="1">
+              <a:lnSpc>
+                <a:spcPct val="90000"/>
+              </a:lnSpc>
+              <a:spcBef>
+                <a:spcPts val="500"/>
+              </a:spcBef>
+              <a:buFont typeface="Arial" panose="020B0604020202020204" pitchFamily="34" charset="0"/>
+              <a:buChar char="•"/>
+              <a:defRPr sz="1800" kern="1200">
+                <a:solidFill>
+                  <a:schemeClr val="tx1"/>
+                </a:solidFill>
+                <a:latin typeface="+mn-lt"/>
+                <a:ea typeface="+mn-ea"/>
+                <a:cs typeface="+mn-cs"/>
+              </a:defRPr>
+            </a:lvl9pPr>
+          </a:lstStyle>
+          <a:p>
+            <a:pPr algn="ctr"/>
+            <a:r>
+              <a:rPr lang="en-US" sz="4800" dirty="0">
+                <a:solidFill>
+                  <a:sysClr val="windowText" lastClr="000000"/>
+                </a:solidFill>
+                <a:latin typeface="Arial" panose="020B0604020202020204" pitchFamily="34" charset="0"/>
+                <a:cs typeface="Arial" panose="020B0604020202020204" pitchFamily="34" charset="0"/>
+              </a:rPr>
+              <a:t>What are those instructions?</a:t>
+            </a:r>
+          </a:p>
+          <a:p>
+            <a:pPr algn="ctr"/>
+            <a:r>
+              <a:rPr lang="en-US" sz="4800" dirty="0">
+                <a:solidFill>
+                  <a:sysClr val="windowText" lastClr="000000"/>
+                </a:solidFill>
+                <a:latin typeface="Arial" panose="020B0604020202020204" pitchFamily="34" charset="0"/>
+                <a:cs typeface="Arial" panose="020B0604020202020204" pitchFamily="34" charset="0"/>
+              </a:rPr>
+              <a:t>(a brief introduction to x86 instruction set)</a:t>
+            </a:r>
+          </a:p>
+          <a:p>
+            <a:pPr algn="ctr"/>
+            <a:endParaRPr lang="en-US" sz="4800" dirty="0">
+              <a:solidFill>
+                <a:sysClr val="windowText" lastClr="000000"/>
+              </a:solidFill>
+              <a:latin typeface="Arial" panose="020B0604020202020204" pitchFamily="34" charset="0"/>
+              <a:cs typeface="Arial" panose="020B0604020202020204" pitchFamily="34" charset="0"/>
+            </a:endParaRPr>
+          </a:p>
+          <a:p>
+            <a:pPr algn="ctr"/>
+            <a:r>
+              <a:rPr lang="en-US" sz="2800" dirty="0">
+                <a:solidFill>
+                  <a:sysClr val="windowText" lastClr="000000"/>
+                </a:solidFill>
+                <a:latin typeface="Arial" panose="020B0604020202020204" pitchFamily="34" charset="0"/>
+                <a:cs typeface="Arial" panose="020B0604020202020204" pitchFamily="34" charset="0"/>
+              </a:rPr>
+              <a:t>This part is based on David Evans’ x86 Assembly Guide</a:t>
+            </a:r>
+          </a:p>
+          <a:p>
+            <a:pPr algn="ctr"/>
+            <a:r>
+              <a:rPr lang="en-US" sz="2400" dirty="0">
+                <a:solidFill>
+                  <a:sysClr val="windowText" lastClr="000000"/>
+                </a:solidFill>
+                <a:latin typeface="Arial" panose="020B0604020202020204" pitchFamily="34" charset="0"/>
+                <a:cs typeface="Arial" panose="020B0604020202020204" pitchFamily="34" charset="0"/>
+                <a:hlinkClick r:id="rId3"/>
+              </a:rPr>
+              <a:t>http://www.cs.virginia.edu/~evans/cs216/guides/x86.html</a:t>
+            </a:r>
+          </a:p>
+          <a:p>
+            <a:pPr algn="ctr"/>
+            <a:endParaRPr lang="en-US" sz="2400" dirty="0">
+              <a:solidFill>
+                <a:sysClr val="windowText" lastClr="000000"/>
+              </a:solidFill>
+              <a:latin typeface="Arial" panose="020B0604020202020204" pitchFamily="34" charset="0"/>
+              <a:cs typeface="Arial" panose="020B0604020202020204" pitchFamily="34" charset="0"/>
+            </a:endParaRPr>
+          </a:p>
+          <a:p>
+            <a:pPr algn="ctr"/>
+            <a:r>
+              <a:rPr lang="en-US" sz="2400" dirty="0">
+                <a:solidFill>
+                  <a:sysClr val="windowText" lastClr="000000"/>
+                </a:solidFill>
+                <a:latin typeface="Arial" panose="020B0604020202020204" pitchFamily="34" charset="0"/>
+                <a:cs typeface="Arial" panose="020B0604020202020204" pitchFamily="34" charset="0"/>
+              </a:rPr>
+              <a:t>and Yale FLINT’s group version of the same manual converted to GNU ASM syntax</a:t>
+            </a:r>
+          </a:p>
+          <a:p>
+            <a:pPr algn="ctr"/>
+            <a:r>
+              <a:rPr lang="en-US" sz="2400" dirty="0">
+                <a:solidFill>
+                  <a:sysClr val="windowText" lastClr="000000"/>
+                </a:solidFill>
+                <a:latin typeface="Arial" panose="020B0604020202020204" pitchFamily="34" charset="0"/>
+                <a:cs typeface="Arial" panose="020B0604020202020204" pitchFamily="34" charset="0"/>
+                <a:hlinkClick r:id="rId4"/>
+              </a:rPr>
+              <a:t>https://flint.cs.yale.edu/cs421/papers/x86-asm/asm.html</a:t>
+            </a:r>
+          </a:p>
+          <a:p>
+            <a:pPr algn="ctr"/>
+            <a:endParaRPr lang="en-US" sz="4800" dirty="0">
+              <a:solidFill>
+                <a:sysClr val="windowText" lastClr="000000"/>
+              </a:solidFill>
+              <a:latin typeface="Arial" panose="020B0604020202020204" pitchFamily="34" charset="0"/>
+              <a:cs typeface="Arial" panose="020B0604020202020204" pitchFamily="34" charset="0"/>
+            </a:endParaRPr>
+          </a:p>
+        </p:txBody>
+      </p:sp>
+    </p:spTree>
+  </p:cSld>
+  <p:clrMapOvr>
+    <a:masterClrMapping/>
+  </p:clrMapOvr>
+</p:sld>
+</file>
+
+<file path=ppt/slides/slide50.xml><?xml version="1.0" encoding="utf-8"?>
+<p:sld xmlns:a="http://schemas.openxmlformats.org/drawingml/2006/main" xmlns:r="http://schemas.openxmlformats.org/officeDocument/2006/relationships" xmlns:p="http://schemas.openxmlformats.org/presentationml/2006/main">
+  <p:cSld>
+    <p:spTree>
+      <p:nvGrpSpPr>
+        <p:cNvPr id="1" name="">
+          <a:extLst>
+            <a:ext uri="{FF2B5EF4-FFF2-40B4-BE49-F238E27FC236}">
+              <a16:creationId xmlns:a16="http://schemas.microsoft.com/office/drawing/2014/main" id="{98E057FE-74E8-6EF1-2048-A8C8CDBB7ADF}"/>
+            </a:ext>
+          </a:extLst>
+        </p:cNvPr>
+        <p:cNvGrpSpPr/>
+        <p:nvPr/>
+      </p:nvGrpSpPr>
+      <p:grpSpPr>
+        <a:xfrm>
+          <a:off x="0" y="0"/>
+          <a:ext cx="0" cy="0"/>
+          <a:chOff x="0" y="0"/>
+          <a:chExt cx="0" cy="0"/>
+        </a:xfrm>
+      </p:grpSpPr>
+      <p:sp>
+        <p:nvSpPr>
+          <p:cNvPr id="2" name="Title 1">
+            <a:extLst>
+              <a:ext uri="{FF2B5EF4-FFF2-40B4-BE49-F238E27FC236}">
+                <a16:creationId xmlns:a16="http://schemas.microsoft.com/office/drawing/2014/main" id="{C42AD945-9B42-2917-BC97-7D5A06D7CD01}"/>
+              </a:ext>
+            </a:extLst>
+          </p:cNvPr>
+          <p:cNvSpPr txBox="1">
+            <a:spLocks noGrp="1"/>
+          </p:cNvSpPr>
+          <p:nvPr>
+            <p:ph type="title" idx="4294967295"/>
+          </p:nvPr>
+        </p:nvSpPr>
+        <p:spPr/>
+        <p:txBody>
+          <a:bodyPr/>
+          <a:lstStyle/>
+          <a:p>
+            <a:pPr lvl="0"/>
+            <a:r>
+              <a:rPr lang="en-US" dirty="0"/>
+              <a:t>Poll Q3: Is this a legal instruction</a:t>
+            </a:r>
+          </a:p>
+        </p:txBody>
+      </p:sp>
+      <p:sp>
+        <p:nvSpPr>
+          <p:cNvPr id="3" name="Text Placeholder 2">
+            <a:extLst>
+              <a:ext uri="{FF2B5EF4-FFF2-40B4-BE49-F238E27FC236}">
+                <a16:creationId xmlns:a16="http://schemas.microsoft.com/office/drawing/2014/main" id="{E765CE7A-FD4D-F88C-3EB3-36501679B657}"/>
+              </a:ext>
+            </a:extLst>
+          </p:cNvPr>
+          <p:cNvSpPr txBox="1">
+            <a:spLocks noGrp="1"/>
+          </p:cNvSpPr>
+          <p:nvPr>
+            <p:ph type="body" idx="4294967295"/>
+          </p:nvPr>
+        </p:nvSpPr>
+        <p:spPr>
+          <a:xfrm>
+            <a:off x="503999" y="1769040"/>
+            <a:ext cx="9071640" cy="5088960"/>
+          </a:xfrm>
+        </p:spPr>
+        <p:txBody>
+          <a:bodyPr>
+            <a:normAutofit/>
+          </a:bodyPr>
+          <a:lstStyle/>
+          <a:p>
+            <a:pPr lvl="0"/>
+            <a:r>
+              <a:rPr lang="en-US" sz="2400" dirty="0">
+                <a:solidFill>
+                  <a:srgbClr val="94476B"/>
+                </a:solidFill>
+                <a:latin typeface="FiraMono Nerd Font Mono" panose="020B0509050000020004" pitchFamily="49" charset="0"/>
+                <a:ea typeface="FiraMono Nerd Font Mono" panose="020B0509050000020004" pitchFamily="49" charset="0"/>
+              </a:rPr>
+              <a:t>mov [</a:t>
+            </a:r>
+            <a:r>
+              <a:rPr lang="en-US" sz="2400" dirty="0" err="1">
+                <a:solidFill>
+                  <a:srgbClr val="94476B"/>
+                </a:solidFill>
+                <a:latin typeface="FiraMono Nerd Font Mono" panose="020B0509050000020004" pitchFamily="49" charset="0"/>
+                <a:ea typeface="FiraMono Nerd Font Mono" panose="020B0509050000020004" pitchFamily="49" charset="0"/>
+              </a:rPr>
+              <a:t>ebx</a:t>
+            </a:r>
+            <a:r>
+              <a:rPr lang="en-US" sz="2400" dirty="0">
+                <a:solidFill>
+                  <a:srgbClr val="94476B"/>
+                </a:solidFill>
+                <a:latin typeface="FiraMono Nerd Font Mono" panose="020B0509050000020004" pitchFamily="49" charset="0"/>
+                <a:ea typeface="FiraMono Nerd Font Mono" panose="020B0509050000020004" pitchFamily="49" charset="0"/>
+              </a:rPr>
+              <a:t>], [</a:t>
+            </a:r>
+            <a:r>
+              <a:rPr lang="en-US" sz="2400" dirty="0" err="1">
+                <a:solidFill>
+                  <a:srgbClr val="94476B"/>
+                </a:solidFill>
+                <a:latin typeface="FiraMono Nerd Font Mono" panose="020B0509050000020004" pitchFamily="49" charset="0"/>
+                <a:ea typeface="FiraMono Nerd Font Mono" panose="020B0509050000020004" pitchFamily="49" charset="0"/>
+              </a:rPr>
+              <a:t>eax</a:t>
+            </a:r>
+            <a:r>
+              <a:rPr lang="en-US" sz="2400" dirty="0">
+                <a:solidFill>
+                  <a:srgbClr val="94476B"/>
+                </a:solidFill>
+                <a:latin typeface="FiraMono Nerd Font Mono" panose="020B0509050000020004" pitchFamily="49" charset="0"/>
+                <a:ea typeface="FiraMono Nerd Font Mono" panose="020B0509050000020004" pitchFamily="49" charset="0"/>
+              </a:rPr>
+              <a:t>] </a:t>
+            </a:r>
+          </a:p>
+        </p:txBody>
+      </p:sp>
+    </p:spTree>
+    <p:extLst>
+      <p:ext uri="{BB962C8B-B14F-4D97-AF65-F5344CB8AC3E}">
+        <p14:creationId xmlns:p14="http://schemas.microsoft.com/office/powerpoint/2010/main" val="2481833887"/>
+      </p:ext>
+    </p:extLst>
+  </p:cSld>
+  <p:clrMapOvr>
+    <a:masterClrMapping/>
+  </p:clrMapOvr>
+</p:sld>
+</file>
+
+<file path=ppt/slides/slide51.xml><?xml version="1.0" encoding="utf-8"?>
+<p:sld xmlns:a="http://schemas.openxmlformats.org/drawingml/2006/main" xmlns:r="http://schemas.openxmlformats.org/officeDocument/2006/relationships" xmlns:p="http://schemas.openxmlformats.org/presentationml/2006/main">
+  <p:cSld>
+    <p:spTree>
+      <p:nvGrpSpPr>
+        <p:cNvPr id="1" name="">
+          <a:extLst>
+            <a:ext uri="{FF2B5EF4-FFF2-40B4-BE49-F238E27FC236}">
+              <a16:creationId xmlns:a16="http://schemas.microsoft.com/office/drawing/2014/main" id="{32D22910-F588-D61D-F5ED-9E5641BC0319}"/>
+            </a:ext>
+          </a:extLst>
+        </p:cNvPr>
+        <p:cNvGrpSpPr/>
+        <p:nvPr/>
+      </p:nvGrpSpPr>
+      <p:grpSpPr>
+        <a:xfrm>
+          <a:off x="0" y="0"/>
+          <a:ext cx="0" cy="0"/>
+          <a:chOff x="0" y="0"/>
+          <a:chExt cx="0" cy="0"/>
+        </a:xfrm>
+      </p:grpSpPr>
+      <p:sp>
+        <p:nvSpPr>
+          <p:cNvPr id="2" name="Title 1">
+            <a:extLst>
+              <a:ext uri="{FF2B5EF4-FFF2-40B4-BE49-F238E27FC236}">
+                <a16:creationId xmlns:a16="http://schemas.microsoft.com/office/drawing/2014/main" id="{736FB26D-CC30-2DFE-7792-3CE9630357E9}"/>
+              </a:ext>
+            </a:extLst>
+          </p:cNvPr>
+          <p:cNvSpPr>
+            <a:spLocks noGrp="1"/>
+          </p:cNvSpPr>
+          <p:nvPr>
+            <p:ph type="ctrTitle"/>
+          </p:nvPr>
+        </p:nvSpPr>
+        <p:spPr/>
+        <p:txBody>
+          <a:bodyPr/>
+          <a:lstStyle/>
+          <a:p>
+            <a:endParaRPr lang="en-US"/>
+          </a:p>
+        </p:txBody>
+      </p:sp>
+      <p:sp>
+        <p:nvSpPr>
+          <p:cNvPr id="3" name="Subtitle 2">
+            <a:extLst>
+              <a:ext uri="{FF2B5EF4-FFF2-40B4-BE49-F238E27FC236}">
+                <a16:creationId xmlns:a16="http://schemas.microsoft.com/office/drawing/2014/main" id="{C343FF82-E999-9CC2-454C-3F49086D47E2}"/>
+              </a:ext>
+            </a:extLst>
+          </p:cNvPr>
+          <p:cNvSpPr>
+            <a:spLocks noGrp="1"/>
+          </p:cNvSpPr>
+          <p:nvPr>
+            <p:ph type="subTitle" idx="1"/>
+          </p:nvPr>
+        </p:nvSpPr>
+        <p:spPr/>
+        <p:txBody>
+          <a:bodyPr/>
+          <a:lstStyle/>
+          <a:p>
+            <a:endParaRPr lang="en-US"/>
+          </a:p>
+        </p:txBody>
+      </p:sp>
+      <p:pic>
+        <p:nvPicPr>
+          <p:cNvPr id="5" name="slide.url=https://www.polleverywhere.com/multiple_choice_polls/kDWvtqhRVLbMKc48fwMVg?state=opened&amp;flow=Default&amp;onscreen=persist">
+            <a:extLst>
+              <a:ext uri="{FF2B5EF4-FFF2-40B4-BE49-F238E27FC236}">
+                <a16:creationId xmlns:a16="http://schemas.microsoft.com/office/drawing/2014/main" id="{3066E591-6803-6177-BBF6-329CBA95A931}"/>
+              </a:ext>
+            </a:extLst>
+          </p:cNvPr>
+          <p:cNvPicPr>
+            <a:picLocks/>
+          </p:cNvPicPr>
+          <p:nvPr/>
+        </p:nvPicPr>
+        <p:blipFill>
+          <a:blip r:embed="rId3"/>
+          <a:stretch>
+            <a:fillRect/>
+          </a:stretch>
+        </p:blipFill>
+        <p:spPr>
+          <a:xfrm>
+            <a:off x="63500" y="63500"/>
+            <a:ext cx="9953625" cy="7432675"/>
+          </a:xfrm>
+          <a:prstGeom prst="rect">
+            <a:avLst/>
+          </a:prstGeom>
+        </p:spPr>
+      </p:pic>
+    </p:spTree>
+    <p:extLst>
+      <p:ext uri="{BB962C8B-B14F-4D97-AF65-F5344CB8AC3E}">
+        <p14:creationId xmlns:p14="http://schemas.microsoft.com/office/powerpoint/2010/main" val="1665182782"/>
+      </p:ext>
+    </p:extLst>
+  </p:cSld>
+  <p:clrMapOvr>
+    <a:masterClrMapping/>
+  </p:clrMapOvr>
+</p:sld>
+</file>
+
+<file path=ppt/slides/slide52.xml><?xml version="1.0" encoding="utf-8"?>
 <p:sld xmlns:a="http://schemas.openxmlformats.org/drawingml/2006/main" xmlns:r="http://schemas.openxmlformats.org/officeDocument/2006/relationships" xmlns:p="http://schemas.openxmlformats.org/presentationml/2006/main">
   <p:cSld name="page40">
     <p:spTree>
@@ -22183,7 +24068,7 @@
 </p:sld>
 </file>
 
-<file path=ppt/slides/slide47.xml><?xml version="1.0" encoding="utf-8"?>
+<file path=ppt/slides/slide53.xml><?xml version="1.0" encoding="utf-8"?>
 <p:sld xmlns:a="http://schemas.openxmlformats.org/drawingml/2006/main" xmlns:r="http://schemas.openxmlformats.org/officeDocument/2006/relationships" xmlns:p="http://schemas.openxmlformats.org/presentationml/2006/main">
   <p:cSld name="page41">
     <p:spTree>
@@ -22242,7 +24127,7 @@
 </p:sld>
 </file>
 
-<file path=ppt/slides/slide48.xml><?xml version="1.0" encoding="utf-8"?>
+<file path=ppt/slides/slide54.xml><?xml version="1.0" encoding="utf-8"?>
 <p:sld xmlns:a="http://schemas.openxmlformats.org/drawingml/2006/main" xmlns:r="http://schemas.openxmlformats.org/officeDocument/2006/relationships" xmlns:p="http://schemas.openxmlformats.org/presentationml/2006/main">
   <p:cSld name="page42">
     <p:spTree>
@@ -22381,7 +24266,16 @@
               <a:rPr lang="en-US" sz="3200" dirty="0">
                 <a:latin typeface="Liberation Sans" pitchFamily="18"/>
               </a:rPr>
-              <a:t>Pointed by a special register ESP</a:t>
+              <a:t>Pointed by a special register </a:t>
+            </a:r>
+            <a:r>
+              <a:rPr lang="en-US" sz="3200" dirty="0">
+                <a:solidFill>
+                  <a:srgbClr val="0070C0"/>
+                </a:solidFill>
+                <a:latin typeface="Liberation Sans" pitchFamily="18"/>
+              </a:rPr>
+              <a:t>ESP</a:t>
             </a:r>
           </a:p>
           <a:p>
@@ -22392,7 +24286,15 @@
             </a:pPr>
             <a:r>
               <a:rPr lang="en-US" dirty="0"/>
-              <a:t>You can change ESP</a:t>
+              <a:t>You can change </a:t>
+            </a:r>
+            <a:r>
+              <a:rPr lang="en-US" dirty="0">
+                <a:solidFill>
+                  <a:srgbClr val="0070C0"/>
+                </a:solidFill>
+              </a:rPr>
+              <a:t>ESP</a:t>
             </a:r>
           </a:p>
           <a:p>
@@ -22799,7 +24701,7 @@
 </p:sld>
 </file>
 
-<file path=ppt/slides/slide49.xml><?xml version="1.0" encoding="utf-8"?>
+<file path=ppt/slides/slide55.xml><?xml version="1.0" encoding="utf-8"?>
 <p:sld xmlns:a="http://schemas.openxmlformats.org/drawingml/2006/main" xmlns:r="http://schemas.openxmlformats.org/officeDocument/2006/relationships" xmlns:p="http://schemas.openxmlformats.org/presentationml/2006/main">
   <p:cSld name="page43">
     <p:spTree>
@@ -22858,336 +24760,7 @@
 </p:sld>
 </file>
 
-<file path=ppt/slides/slide5.xml><?xml version="1.0" encoding="utf-8"?>
-<p:sld xmlns:a="http://schemas.openxmlformats.org/drawingml/2006/main" xmlns:r="http://schemas.openxmlformats.org/officeDocument/2006/relationships" xmlns:p="http://schemas.openxmlformats.org/presentationml/2006/main">
-  <p:cSld name="page5">
-    <p:spTree>
-      <p:nvGrpSpPr>
-        <p:cNvPr id="1" name=""/>
-        <p:cNvGrpSpPr/>
-        <p:nvPr/>
-      </p:nvGrpSpPr>
-      <p:grpSpPr>
-        <a:xfrm>
-          <a:off x="0" y="0"/>
-          <a:ext cx="0" cy="0"/>
-          <a:chOff x="0" y="0"/>
-          <a:chExt cx="0" cy="0"/>
-        </a:xfrm>
-      </p:grpSpPr>
-      <p:sp>
-        <p:nvSpPr>
-          <p:cNvPr id="5" name="Subtitle 1">
-            <a:extLst>
-              <a:ext uri="{FF2B5EF4-FFF2-40B4-BE49-F238E27FC236}">
-                <a16:creationId xmlns:a16="http://schemas.microsoft.com/office/drawing/2014/main" id="{4E479181-EE76-8E7F-7A49-66062E672BB4}"/>
-              </a:ext>
-            </a:extLst>
-          </p:cNvPr>
-          <p:cNvSpPr txBox="1">
-            <a:spLocks/>
-          </p:cNvSpPr>
-          <p:nvPr/>
-        </p:nvSpPr>
-        <p:spPr>
-          <a:xfrm>
-            <a:off x="504492" y="1085091"/>
-            <a:ext cx="9071640" cy="5851800"/>
-          </a:xfrm>
-          <a:prstGeom prst="rect">
-            <a:avLst/>
-          </a:prstGeom>
-          <a:noFill/>
-          <a:ln>
-            <a:noFill/>
-          </a:ln>
-        </p:spPr>
-        <p:txBody>
-          <a:bodyPr lIns="0" tIns="0" rIns="0" bIns="0" anchor="ctr">
-            <a:normAutofit fontScale="92500" lnSpcReduction="10000"/>
-          </a:bodyPr>
-          <a:lstStyle>
-            <a:lvl1pPr marL="0" marR="0" indent="0" hangingPunct="0">
-              <a:spcBef>
-                <a:spcPts val="0"/>
-              </a:spcBef>
-              <a:spcAft>
-                <a:spcPts val="1414"/>
-              </a:spcAft>
-              <a:tabLst/>
-              <a:defRPr lang="en-US" sz="3200" b="0" i="0" u="none" strike="noStrike" kern="1200">
-                <a:ln>
-                  <a:noFill/>
-                </a:ln>
-                <a:latin typeface="Liberation Sans" pitchFamily="18"/>
-              </a:defRPr>
-            </a:lvl1pPr>
-            <a:lvl2pPr marL="685800" indent="-228600" algn="l" defTabSz="914400" rtl="0" eaLnBrk="1" latinLnBrk="0" hangingPunct="1">
-              <a:lnSpc>
-                <a:spcPct val="90000"/>
-              </a:lnSpc>
-              <a:spcBef>
-                <a:spcPts val="500"/>
-              </a:spcBef>
-              <a:buFont typeface="Arial" panose="020B0604020202020204" pitchFamily="34" charset="0"/>
-              <a:buChar char="•"/>
-              <a:defRPr sz="2400" kern="1200">
-                <a:solidFill>
-                  <a:schemeClr val="tx1"/>
-                </a:solidFill>
-                <a:latin typeface="+mn-lt"/>
-                <a:ea typeface="+mn-ea"/>
-                <a:cs typeface="+mn-cs"/>
-              </a:defRPr>
-            </a:lvl2pPr>
-            <a:lvl3pPr marL="1143000" indent="-228600" algn="l" defTabSz="914400" rtl="0" eaLnBrk="1" latinLnBrk="0" hangingPunct="1">
-              <a:lnSpc>
-                <a:spcPct val="90000"/>
-              </a:lnSpc>
-              <a:spcBef>
-                <a:spcPts val="500"/>
-              </a:spcBef>
-              <a:buFont typeface="Arial" panose="020B0604020202020204" pitchFamily="34" charset="0"/>
-              <a:buChar char="•"/>
-              <a:defRPr sz="2000" kern="1200">
-                <a:solidFill>
-                  <a:schemeClr val="tx1"/>
-                </a:solidFill>
-                <a:latin typeface="+mn-lt"/>
-                <a:ea typeface="+mn-ea"/>
-                <a:cs typeface="+mn-cs"/>
-              </a:defRPr>
-            </a:lvl3pPr>
-            <a:lvl4pPr marL="1600200" indent="-228600" algn="l" defTabSz="914400" rtl="0" eaLnBrk="1" latinLnBrk="0" hangingPunct="1">
-              <a:lnSpc>
-                <a:spcPct val="90000"/>
-              </a:lnSpc>
-              <a:spcBef>
-                <a:spcPts val="500"/>
-              </a:spcBef>
-              <a:buFont typeface="Arial" panose="020B0604020202020204" pitchFamily="34" charset="0"/>
-              <a:buChar char="•"/>
-              <a:defRPr sz="1800" kern="1200">
-                <a:solidFill>
-                  <a:schemeClr val="tx1"/>
-                </a:solidFill>
-                <a:latin typeface="+mn-lt"/>
-                <a:ea typeface="+mn-ea"/>
-                <a:cs typeface="+mn-cs"/>
-              </a:defRPr>
-            </a:lvl4pPr>
-            <a:lvl5pPr marL="2057400" indent="-228600" algn="l" defTabSz="914400" rtl="0" eaLnBrk="1" latinLnBrk="0" hangingPunct="1">
-              <a:lnSpc>
-                <a:spcPct val="90000"/>
-              </a:lnSpc>
-              <a:spcBef>
-                <a:spcPts val="500"/>
-              </a:spcBef>
-              <a:buFont typeface="Arial" panose="020B0604020202020204" pitchFamily="34" charset="0"/>
-              <a:buChar char="•"/>
-              <a:defRPr sz="1800" kern="1200">
-                <a:solidFill>
-                  <a:schemeClr val="tx1"/>
-                </a:solidFill>
-                <a:latin typeface="+mn-lt"/>
-                <a:ea typeface="+mn-ea"/>
-                <a:cs typeface="+mn-cs"/>
-              </a:defRPr>
-            </a:lvl5pPr>
-            <a:lvl6pPr marL="2514600" indent="-228600" algn="l" defTabSz="914400" rtl="0" eaLnBrk="1" latinLnBrk="0" hangingPunct="1">
-              <a:lnSpc>
-                <a:spcPct val="90000"/>
-              </a:lnSpc>
-              <a:spcBef>
-                <a:spcPts val="500"/>
-              </a:spcBef>
-              <a:buFont typeface="Arial" panose="020B0604020202020204" pitchFamily="34" charset="0"/>
-              <a:buChar char="•"/>
-              <a:defRPr sz="1800" kern="1200">
-                <a:solidFill>
-                  <a:schemeClr val="tx1"/>
-                </a:solidFill>
-                <a:latin typeface="+mn-lt"/>
-                <a:ea typeface="+mn-ea"/>
-                <a:cs typeface="+mn-cs"/>
-              </a:defRPr>
-            </a:lvl6pPr>
-            <a:lvl7pPr marL="2971800" indent="-228600" algn="l" defTabSz="914400" rtl="0" eaLnBrk="1" latinLnBrk="0" hangingPunct="1">
-              <a:lnSpc>
-                <a:spcPct val="90000"/>
-              </a:lnSpc>
-              <a:spcBef>
-                <a:spcPts val="500"/>
-              </a:spcBef>
-              <a:buFont typeface="Arial" panose="020B0604020202020204" pitchFamily="34" charset="0"/>
-              <a:buChar char="•"/>
-              <a:defRPr sz="1800" kern="1200">
-                <a:solidFill>
-                  <a:schemeClr val="tx1"/>
-                </a:solidFill>
-                <a:latin typeface="+mn-lt"/>
-                <a:ea typeface="+mn-ea"/>
-                <a:cs typeface="+mn-cs"/>
-              </a:defRPr>
-            </a:lvl7pPr>
-            <a:lvl8pPr marL="3429000" indent="-228600" algn="l" defTabSz="914400" rtl="0" eaLnBrk="1" latinLnBrk="0" hangingPunct="1">
-              <a:lnSpc>
-                <a:spcPct val="90000"/>
-              </a:lnSpc>
-              <a:spcBef>
-                <a:spcPts val="500"/>
-              </a:spcBef>
-              <a:buFont typeface="Arial" panose="020B0604020202020204" pitchFamily="34" charset="0"/>
-              <a:buChar char="•"/>
-              <a:defRPr sz="1800" kern="1200">
-                <a:solidFill>
-                  <a:schemeClr val="tx1"/>
-                </a:solidFill>
-                <a:latin typeface="+mn-lt"/>
-                <a:ea typeface="+mn-ea"/>
-                <a:cs typeface="+mn-cs"/>
-              </a:defRPr>
-            </a:lvl8pPr>
-            <a:lvl9pPr marL="3886200" indent="-228600" algn="l" defTabSz="914400" rtl="0" eaLnBrk="1" latinLnBrk="0" hangingPunct="1">
-              <a:lnSpc>
-                <a:spcPct val="90000"/>
-              </a:lnSpc>
-              <a:spcBef>
-                <a:spcPts val="500"/>
-              </a:spcBef>
-              <a:buFont typeface="Arial" panose="020B0604020202020204" pitchFamily="34" charset="0"/>
-              <a:buChar char="•"/>
-              <a:defRPr sz="1800" kern="1200">
-                <a:solidFill>
-                  <a:schemeClr val="tx1"/>
-                </a:solidFill>
-                <a:latin typeface="+mn-lt"/>
-                <a:ea typeface="+mn-ea"/>
-                <a:cs typeface="+mn-cs"/>
-              </a:defRPr>
-            </a:lvl9pPr>
-          </a:lstStyle>
-          <a:p>
-            <a:pPr algn="ctr"/>
-            <a:r>
-              <a:rPr lang="en-US" sz="4800" dirty="0">
-                <a:solidFill>
-                  <a:sysClr val="windowText" lastClr="000000"/>
-                </a:solidFill>
-                <a:latin typeface="Arial" panose="020B0604020202020204" pitchFamily="34" charset="0"/>
-                <a:cs typeface="Arial" panose="020B0604020202020204" pitchFamily="34" charset="0"/>
-              </a:rPr>
-              <a:t>What are those instructions?</a:t>
-            </a:r>
-          </a:p>
-          <a:p>
-            <a:pPr algn="ctr"/>
-            <a:r>
-              <a:rPr lang="en-US" sz="4800" dirty="0">
-                <a:solidFill>
-                  <a:sysClr val="windowText" lastClr="000000"/>
-                </a:solidFill>
-                <a:latin typeface="Arial" panose="020B0604020202020204" pitchFamily="34" charset="0"/>
-                <a:cs typeface="Arial" panose="020B0604020202020204" pitchFamily="34" charset="0"/>
-              </a:rPr>
-              <a:t>(a brief introduction to x86 instruction set)</a:t>
-            </a:r>
-          </a:p>
-          <a:p>
-            <a:pPr algn="ctr"/>
-            <a:endParaRPr lang="en-US" sz="4800" dirty="0">
-              <a:solidFill>
-                <a:sysClr val="windowText" lastClr="000000"/>
-              </a:solidFill>
-              <a:latin typeface="Arial" panose="020B0604020202020204" pitchFamily="34" charset="0"/>
-              <a:cs typeface="Arial" panose="020B0604020202020204" pitchFamily="34" charset="0"/>
-            </a:endParaRPr>
-          </a:p>
-          <a:p>
-            <a:pPr algn="ctr"/>
-            <a:r>
-              <a:rPr lang="en-US" sz="2800" dirty="0">
-                <a:solidFill>
-                  <a:sysClr val="windowText" lastClr="000000"/>
-                </a:solidFill>
-                <a:latin typeface="Arial" panose="020B0604020202020204" pitchFamily="34" charset="0"/>
-                <a:cs typeface="Arial" panose="020B0604020202020204" pitchFamily="34" charset="0"/>
-              </a:rPr>
-              <a:t>This part is based on David Evans’ x86 Assembly Guide</a:t>
-            </a:r>
-          </a:p>
-          <a:p>
-            <a:pPr algn="ctr"/>
-            <a:r>
-              <a:rPr lang="en-US" sz="2400" dirty="0">
-                <a:solidFill>
-                  <a:sysClr val="windowText" lastClr="000000"/>
-                </a:solidFill>
-                <a:latin typeface="Arial" panose="020B0604020202020204" pitchFamily="34" charset="0"/>
-                <a:cs typeface="Arial" panose="020B0604020202020204" pitchFamily="34" charset="0"/>
-                <a:hlinkClick r:id="rId3"/>
-              </a:rPr>
-              <a:t>http://www.cs.virginia.edu/~evans/cs216/guides/x86.html</a:t>
-            </a:r>
-          </a:p>
-          <a:p>
-            <a:pPr algn="ctr"/>
-            <a:endParaRPr lang="en-US" sz="2400" dirty="0">
-              <a:solidFill>
-                <a:sysClr val="windowText" lastClr="000000"/>
-              </a:solidFill>
-              <a:latin typeface="Arial" panose="020B0604020202020204" pitchFamily="34" charset="0"/>
-              <a:cs typeface="Arial" panose="020B0604020202020204" pitchFamily="34" charset="0"/>
-            </a:endParaRPr>
-          </a:p>
-          <a:p>
-            <a:pPr algn="ctr"/>
-            <a:r>
-              <a:rPr lang="en-US" sz="2400" dirty="0">
-                <a:solidFill>
-                  <a:sysClr val="windowText" lastClr="000000"/>
-                </a:solidFill>
-                <a:latin typeface="Arial" panose="020B0604020202020204" pitchFamily="34" charset="0"/>
-                <a:cs typeface="Arial" panose="020B0604020202020204" pitchFamily="34" charset="0"/>
-              </a:rPr>
-              <a:t>and Yale FLINT’s group version of the same manual converted to GNU ASM syntax</a:t>
-            </a:r>
-          </a:p>
-          <a:p>
-            <a:pPr algn="ctr"/>
-            <a:r>
-              <a:rPr lang="en-US" sz="2400" dirty="0">
-                <a:solidFill>
-                  <a:sysClr val="windowText" lastClr="000000"/>
-                </a:solidFill>
-                <a:latin typeface="Arial" panose="020B0604020202020204" pitchFamily="34" charset="0"/>
-                <a:cs typeface="Arial" panose="020B0604020202020204" pitchFamily="34" charset="0"/>
-                <a:hlinkClick r:id="rId4"/>
-              </a:rPr>
-              <a:t>https://flint.cs.yale.edu/cs421/papers/x86-asm/asm.html</a:t>
-            </a:r>
-          </a:p>
-          <a:p>
-            <a:pPr algn="ctr"/>
-            <a:endParaRPr lang="en-US" sz="4800" dirty="0">
-              <a:solidFill>
-                <a:sysClr val="windowText" lastClr="000000"/>
-              </a:solidFill>
-              <a:latin typeface="Arial" panose="020B0604020202020204" pitchFamily="34" charset="0"/>
-              <a:cs typeface="Arial" panose="020B0604020202020204" pitchFamily="34" charset="0"/>
-            </a:endParaRPr>
-          </a:p>
-        </p:txBody>
-      </p:sp>
-    </p:spTree>
-  </p:cSld>
-  <p:clrMapOvr>
-    <a:masterClrMapping/>
-  </p:clrMapOvr>
-</p:sld>
-</file>
-
-<file path=ppt/slides/slide50.xml><?xml version="1.0" encoding="utf-8"?>
+<file path=ppt/slides/slide56.xml><?xml version="1.0" encoding="utf-8"?>
 <p:sld xmlns:a="http://schemas.openxmlformats.org/drawingml/2006/main" xmlns:r="http://schemas.openxmlformats.org/officeDocument/2006/relationships" xmlns:p="http://schemas.openxmlformats.org/presentationml/2006/main">
   <p:cSld name="page44">
     <p:spTree>
@@ -23640,7 +25213,7 @@
 </p:sld>
 </file>
 
-<file path=ppt/slides/slide51.xml><?xml version="1.0" encoding="utf-8"?>
+<file path=ppt/slides/slide57.xml><?xml version="1.0" encoding="utf-8"?>
 <p:sld xmlns:a="http://schemas.openxmlformats.org/drawingml/2006/main" xmlns:r="http://schemas.openxmlformats.org/officeDocument/2006/relationships" xmlns:p="http://schemas.openxmlformats.org/presentationml/2006/main">
   <p:cSld name="page45">
     <p:spTree>
@@ -24322,7 +25895,7 @@
 </p:sld>
 </file>
 
-<file path=ppt/slides/slide52.xml><?xml version="1.0" encoding="utf-8"?>
+<file path=ppt/slides/slide58.xml><?xml version="1.0" encoding="utf-8"?>
 <p:sld xmlns:a="http://schemas.openxmlformats.org/drawingml/2006/main" xmlns:r="http://schemas.openxmlformats.org/officeDocument/2006/relationships" xmlns:p="http://schemas.openxmlformats.org/presentationml/2006/main">
   <p:cSld name="page46">
     <p:spTree>
@@ -25022,7 +26595,7 @@
 </p:sld>
 </file>
 
-<file path=ppt/slides/slide53.xml><?xml version="1.0" encoding="utf-8"?>
+<file path=ppt/slides/slide59.xml><?xml version="1.0" encoding="utf-8"?>
 <p:sld xmlns:a="http://schemas.openxmlformats.org/drawingml/2006/main" xmlns:r="http://schemas.openxmlformats.org/officeDocument/2006/relationships" xmlns:p="http://schemas.openxmlformats.org/presentationml/2006/main">
   <p:cSld name="page47">
     <p:spTree>
@@ -25322,7 +26895,165 @@
 </p:sld>
 </file>
 
-<file path=ppt/slides/slide54.xml><?xml version="1.0" encoding="utf-8"?>
+<file path=ppt/slides/slide6.xml><?xml version="1.0" encoding="utf-8"?>
+<p:sld xmlns:a="http://schemas.openxmlformats.org/drawingml/2006/main" xmlns:r="http://schemas.openxmlformats.org/officeDocument/2006/relationships" xmlns:p="http://schemas.openxmlformats.org/presentationml/2006/main">
+  <p:cSld name="page6">
+    <p:spTree>
+      <p:nvGrpSpPr>
+        <p:cNvPr id="1" name=""/>
+        <p:cNvGrpSpPr/>
+        <p:nvPr/>
+      </p:nvGrpSpPr>
+      <p:grpSpPr>
+        <a:xfrm>
+          <a:off x="0" y="0"/>
+          <a:ext cx="0" cy="0"/>
+          <a:chOff x="0" y="0"/>
+          <a:chExt cx="0" cy="0"/>
+        </a:xfrm>
+      </p:grpSpPr>
+      <p:sp>
+        <p:nvSpPr>
+          <p:cNvPr id="2" name="Title 1">
+            <a:extLst>
+              <a:ext uri="{FF2B5EF4-FFF2-40B4-BE49-F238E27FC236}">
+                <a16:creationId xmlns:a16="http://schemas.microsoft.com/office/drawing/2014/main" id="{FD4F8E11-21AF-B41C-2306-BE065DD63C46}"/>
+              </a:ext>
+            </a:extLst>
+          </p:cNvPr>
+          <p:cNvSpPr txBox="1">
+            <a:spLocks noGrp="1"/>
+          </p:cNvSpPr>
+          <p:nvPr>
+            <p:ph type="title" idx="4294967295"/>
+          </p:nvPr>
+        </p:nvSpPr>
+        <p:spPr/>
+        <p:txBody>
+          <a:bodyPr/>
+          <a:lstStyle/>
+          <a:p>
+            <a:pPr lvl="0"/>
+            <a:r>
+              <a:rPr lang="en-US"/>
+              <a:t>Note</a:t>
+            </a:r>
+          </a:p>
+        </p:txBody>
+      </p:sp>
+      <p:sp>
+        <p:nvSpPr>
+          <p:cNvPr id="3" name="Text Placeholder 2">
+            <a:extLst>
+              <a:ext uri="{FF2B5EF4-FFF2-40B4-BE49-F238E27FC236}">
+                <a16:creationId xmlns:a16="http://schemas.microsoft.com/office/drawing/2014/main" id="{48D32F1B-02C2-2880-3B63-DA7E52519AFC}"/>
+              </a:ext>
+            </a:extLst>
+          </p:cNvPr>
+          <p:cNvSpPr txBox="1">
+            <a:spLocks noGrp="1"/>
+          </p:cNvSpPr>
+          <p:nvPr>
+            <p:ph type="body" idx="4294967295"/>
+          </p:nvPr>
+        </p:nvSpPr>
+        <p:spPr/>
+        <p:txBody>
+          <a:bodyPr/>
+          <a:lstStyle/>
+          <a:p>
+            <a:pPr marL="457200" lvl="0" indent="-457200">
+              <a:buSzPct val="100000"/>
+              <a:buFont typeface="Arial" panose="020B0604020202020204" pitchFamily="34" charset="0"/>
+              <a:buChar char="•"/>
+            </a:pPr>
+            <a:r>
+              <a:rPr lang="en-US" dirty="0">
+                <a:latin typeface="Arial" panose="020B0604020202020204" pitchFamily="34" charset="0"/>
+                <a:cs typeface="Arial" panose="020B0604020202020204" pitchFamily="34" charset="0"/>
+              </a:rPr>
+              <a:t>We’ll be talking about </a:t>
+            </a:r>
+            <a:r>
+              <a:rPr lang="en-US" dirty="0">
+                <a:solidFill>
+                  <a:srgbClr val="1B75BC"/>
+                </a:solidFill>
+                <a:latin typeface="Arial" panose="020B0604020202020204" pitchFamily="34" charset="0"/>
+                <a:cs typeface="Arial" panose="020B0604020202020204" pitchFamily="34" charset="0"/>
+              </a:rPr>
+              <a:t>32bit x86</a:t>
+            </a:r>
+            <a:r>
+              <a:rPr lang="en-US" dirty="0">
+                <a:latin typeface="Arial" panose="020B0604020202020204" pitchFamily="34" charset="0"/>
+                <a:cs typeface="Arial" panose="020B0604020202020204" pitchFamily="34" charset="0"/>
+              </a:rPr>
+              <a:t> instruction set</a:t>
+            </a:r>
+          </a:p>
+          <a:p>
+            <a:pPr marL="457200" lvl="1" indent="-457200" hangingPunct="0">
+              <a:spcBef>
+                <a:spcPts val="0"/>
+              </a:spcBef>
+              <a:spcAft>
+                <a:spcPts val="1414"/>
+              </a:spcAft>
+              <a:buSzPct val="100000"/>
+            </a:pPr>
+            <a:r>
+              <a:rPr lang="en-US" sz="3200" dirty="0">
+                <a:latin typeface="Arial" panose="020B0604020202020204" pitchFamily="34" charset="0"/>
+                <a:cs typeface="Arial" panose="020B0604020202020204" pitchFamily="34" charset="0"/>
+              </a:rPr>
+              <a:t>The version of xv6 we will be using in this class is a 32bit operating system</a:t>
+            </a:r>
+          </a:p>
+          <a:p>
+            <a:pPr marL="457200" lvl="1" indent="-457200" hangingPunct="0">
+              <a:spcBef>
+                <a:spcPts val="0"/>
+              </a:spcBef>
+              <a:spcAft>
+                <a:spcPts val="1414"/>
+              </a:spcAft>
+              <a:buSzPct val="100000"/>
+            </a:pPr>
+            <a:r>
+              <a:rPr lang="en-US" sz="3200" dirty="0">
+                <a:latin typeface="Arial" panose="020B0604020202020204" pitchFamily="34" charset="0"/>
+                <a:cs typeface="Arial" panose="020B0604020202020204" pitchFamily="34" charset="0"/>
+              </a:rPr>
+              <a:t>You’re welcome to take a look at the 64bit port</a:t>
+            </a:r>
+          </a:p>
+          <a:p>
+            <a:pPr marL="457200" lvl="1" indent="-457200" hangingPunct="0">
+              <a:spcBef>
+                <a:spcPts val="0"/>
+              </a:spcBef>
+              <a:spcAft>
+                <a:spcPts val="1414"/>
+              </a:spcAft>
+              <a:buSzPct val="100000"/>
+            </a:pPr>
+            <a:endParaRPr lang="en-US" sz="3200" dirty="0">
+              <a:latin typeface="Arial" panose="020B0604020202020204" pitchFamily="34" charset="0"/>
+              <a:cs typeface="Arial" panose="020B0604020202020204" pitchFamily="34" charset="0"/>
+            </a:endParaRPr>
+          </a:p>
+        </p:txBody>
+      </p:sp>
+    </p:spTree>
+  </p:cSld>
+  <p:clrMapOvr>
+    <a:masterClrMapping/>
+  </p:clrMapOvr>
+</p:sld>
+</file>
+
+<file path=ppt/slides/slide60.xml><?xml version="1.0" encoding="utf-8"?>
 <p:sld xmlns:a="http://schemas.openxmlformats.org/drawingml/2006/main" xmlns:r="http://schemas.openxmlformats.org/officeDocument/2006/relationships" xmlns:p="http://schemas.openxmlformats.org/presentationml/2006/main">
   <p:cSld name="page48">
     <p:spTree>
@@ -25740,7 +27471,7 @@
 </p:sld>
 </file>
 
-<file path=ppt/slides/slide55.xml><?xml version="1.0" encoding="utf-8"?>
+<file path=ppt/slides/slide61.xml><?xml version="1.0" encoding="utf-8"?>
 <p:sld xmlns:a="http://schemas.openxmlformats.org/drawingml/2006/main" xmlns:r="http://schemas.openxmlformats.org/officeDocument/2006/relationships" xmlns:p="http://schemas.openxmlformats.org/presentationml/2006/main">
   <p:cSld name="page49">
     <p:spTree>
@@ -26394,7 +28125,7 @@
 </p:sld>
 </file>
 
-<file path=ppt/slides/slide56.xml><?xml version="1.0" encoding="utf-8"?>
+<file path=ppt/slides/slide62.xml><?xml version="1.0" encoding="utf-8"?>
 <p:sld xmlns:a="http://schemas.openxmlformats.org/drawingml/2006/main" xmlns:r="http://schemas.openxmlformats.org/officeDocument/2006/relationships" xmlns:p="http://schemas.openxmlformats.org/presentationml/2006/main">
   <p:cSld name="page50">
     <p:spTree>
@@ -27085,7 +28816,66 @@
 </p:sld>
 </file>
 
-<file path=ppt/slides/slide57.xml><?xml version="1.0" encoding="utf-8"?>
+<file path=ppt/slides/slide63.xml><?xml version="1.0" encoding="utf-8"?>
+<p:sld xmlns:a="http://schemas.openxmlformats.org/drawingml/2006/main" xmlns:r="http://schemas.openxmlformats.org/officeDocument/2006/relationships" xmlns:p="http://schemas.openxmlformats.org/presentationml/2006/main">
+  <p:cSld name="page52">
+    <p:spTree>
+      <p:nvGrpSpPr>
+        <p:cNvPr id="1" name=""/>
+        <p:cNvGrpSpPr/>
+        <p:nvPr/>
+      </p:nvGrpSpPr>
+      <p:grpSpPr>
+        <a:xfrm>
+          <a:off x="0" y="0"/>
+          <a:ext cx="0" cy="0"/>
+          <a:chOff x="0" y="0"/>
+          <a:chExt cx="0" cy="0"/>
+        </a:xfrm>
+      </p:grpSpPr>
+      <p:sp>
+        <p:nvSpPr>
+          <p:cNvPr id="2" name="Subtitle 1">
+            <a:extLst>
+              <a:ext uri="{FF2B5EF4-FFF2-40B4-BE49-F238E27FC236}">
+                <a16:creationId xmlns:a16="http://schemas.microsoft.com/office/drawing/2014/main" id="{4A397D1B-A9C9-6344-FAB8-1C00E5220CB9}"/>
+              </a:ext>
+            </a:extLst>
+          </p:cNvPr>
+          <p:cNvSpPr txBox="1">
+            <a:spLocks noGrp="1"/>
+          </p:cNvSpPr>
+          <p:nvPr>
+            <p:ph type="subTitle" idx="4294967295"/>
+          </p:nvPr>
+        </p:nvSpPr>
+        <p:spPr>
+          <a:xfrm>
+            <a:off x="503999" y="301320"/>
+            <a:ext cx="9071640" cy="5851800"/>
+          </a:xfrm>
+        </p:spPr>
+        <p:txBody>
+          <a:bodyPr anchor="ctr"/>
+          <a:lstStyle/>
+          <a:p>
+            <a:pPr lvl="0" algn="ctr"/>
+            <a:r>
+              <a:rPr lang="en-US" sz="4400"/>
+              <a:t>Thank you!</a:t>
+            </a:r>
+          </a:p>
+        </p:txBody>
+      </p:sp>
+    </p:spTree>
+  </p:cSld>
+  <p:clrMapOvr>
+    <a:masterClrMapping/>
+  </p:clrMapOvr>
+</p:sld>
+</file>
+
+<file path=ppt/slides/slide64.xml><?xml version="1.0" encoding="utf-8"?>
 <p:sld xmlns:a="http://schemas.openxmlformats.org/drawingml/2006/main" xmlns:r="http://schemas.openxmlformats.org/officeDocument/2006/relationships" xmlns:p="http://schemas.openxmlformats.org/presentationml/2006/main">
   <p:cSld name="page51">
     <p:spTree>
@@ -27153,223 +28943,6 @@
           <a:lstStyle/>
           <a:p>
             <a:endParaRPr lang="en-US"/>
-          </a:p>
-        </p:txBody>
-      </p:sp>
-    </p:spTree>
-  </p:cSld>
-  <p:clrMapOvr>
-    <a:masterClrMapping/>
-  </p:clrMapOvr>
-</p:sld>
-</file>
-
-<file path=ppt/slides/slide58.xml><?xml version="1.0" encoding="utf-8"?>
-<p:sld xmlns:a="http://schemas.openxmlformats.org/drawingml/2006/main" xmlns:r="http://schemas.openxmlformats.org/officeDocument/2006/relationships" xmlns:p="http://schemas.openxmlformats.org/presentationml/2006/main">
-  <p:cSld name="page52">
-    <p:spTree>
-      <p:nvGrpSpPr>
-        <p:cNvPr id="1" name=""/>
-        <p:cNvGrpSpPr/>
-        <p:nvPr/>
-      </p:nvGrpSpPr>
-      <p:grpSpPr>
-        <a:xfrm>
-          <a:off x="0" y="0"/>
-          <a:ext cx="0" cy="0"/>
-          <a:chOff x="0" y="0"/>
-          <a:chExt cx="0" cy="0"/>
-        </a:xfrm>
-      </p:grpSpPr>
-      <p:sp>
-        <p:nvSpPr>
-          <p:cNvPr id="2" name="Subtitle 1">
-            <a:extLst>
-              <a:ext uri="{FF2B5EF4-FFF2-40B4-BE49-F238E27FC236}">
-                <a16:creationId xmlns:a16="http://schemas.microsoft.com/office/drawing/2014/main" id="{4A397D1B-A9C9-6344-FAB8-1C00E5220CB9}"/>
-              </a:ext>
-            </a:extLst>
-          </p:cNvPr>
-          <p:cNvSpPr txBox="1">
-            <a:spLocks noGrp="1"/>
-          </p:cNvSpPr>
-          <p:nvPr>
-            <p:ph type="subTitle" idx="4294967295"/>
-          </p:nvPr>
-        </p:nvSpPr>
-        <p:spPr>
-          <a:xfrm>
-            <a:off x="503999" y="301320"/>
-            <a:ext cx="9071640" cy="5851800"/>
-          </a:xfrm>
-        </p:spPr>
-        <p:txBody>
-          <a:bodyPr anchor="ctr"/>
-          <a:lstStyle/>
-          <a:p>
-            <a:pPr lvl="0" algn="ctr"/>
-            <a:r>
-              <a:rPr lang="en-US" sz="4400"/>
-              <a:t>Thank you!</a:t>
-            </a:r>
-          </a:p>
-        </p:txBody>
-      </p:sp>
-    </p:spTree>
-  </p:cSld>
-  <p:clrMapOvr>
-    <a:masterClrMapping/>
-  </p:clrMapOvr>
-</p:sld>
-</file>
-
-<file path=ppt/slides/slide6.xml><?xml version="1.0" encoding="utf-8"?>
-<p:sld xmlns:a="http://schemas.openxmlformats.org/drawingml/2006/main" xmlns:r="http://schemas.openxmlformats.org/officeDocument/2006/relationships" xmlns:p="http://schemas.openxmlformats.org/presentationml/2006/main">
-  <p:cSld name="page6">
-    <p:spTree>
-      <p:nvGrpSpPr>
-        <p:cNvPr id="1" name=""/>
-        <p:cNvGrpSpPr/>
-        <p:nvPr/>
-      </p:nvGrpSpPr>
-      <p:grpSpPr>
-        <a:xfrm>
-          <a:off x="0" y="0"/>
-          <a:ext cx="0" cy="0"/>
-          <a:chOff x="0" y="0"/>
-          <a:chExt cx="0" cy="0"/>
-        </a:xfrm>
-      </p:grpSpPr>
-      <p:sp>
-        <p:nvSpPr>
-          <p:cNvPr id="2" name="Title 1">
-            <a:extLst>
-              <a:ext uri="{FF2B5EF4-FFF2-40B4-BE49-F238E27FC236}">
-                <a16:creationId xmlns:a16="http://schemas.microsoft.com/office/drawing/2014/main" id="{FD4F8E11-21AF-B41C-2306-BE065DD63C46}"/>
-              </a:ext>
-            </a:extLst>
-          </p:cNvPr>
-          <p:cNvSpPr txBox="1">
-            <a:spLocks noGrp="1"/>
-          </p:cNvSpPr>
-          <p:nvPr>
-            <p:ph type="title" idx="4294967295"/>
-          </p:nvPr>
-        </p:nvSpPr>
-        <p:spPr/>
-        <p:txBody>
-          <a:bodyPr/>
-          <a:lstStyle/>
-          <a:p>
-            <a:pPr lvl="0"/>
-            <a:r>
-              <a:rPr lang="en-US"/>
-              <a:t>Note</a:t>
-            </a:r>
-          </a:p>
-        </p:txBody>
-      </p:sp>
-      <p:sp>
-        <p:nvSpPr>
-          <p:cNvPr id="3" name="Text Placeholder 2">
-            <a:extLst>
-              <a:ext uri="{FF2B5EF4-FFF2-40B4-BE49-F238E27FC236}">
-                <a16:creationId xmlns:a16="http://schemas.microsoft.com/office/drawing/2014/main" id="{48D32F1B-02C2-2880-3B63-DA7E52519AFC}"/>
-              </a:ext>
-            </a:extLst>
-          </p:cNvPr>
-          <p:cNvSpPr txBox="1">
-            <a:spLocks noGrp="1"/>
-          </p:cNvSpPr>
-          <p:nvPr>
-            <p:ph type="body" idx="4294967295"/>
-          </p:nvPr>
-        </p:nvSpPr>
-        <p:spPr/>
-        <p:txBody>
-          <a:bodyPr/>
-          <a:lstStyle/>
-          <a:p>
-            <a:pPr marL="457200" lvl="0" indent="-457200">
-              <a:buSzPct val="100000"/>
-              <a:buFont typeface="Arial" panose="020B0604020202020204" pitchFamily="34" charset="0"/>
-              <a:buChar char="•"/>
-            </a:pPr>
-            <a:r>
-              <a:rPr lang="en-US" dirty="0">
-                <a:latin typeface="Arial" panose="020B0604020202020204" pitchFamily="34" charset="0"/>
-                <a:cs typeface="Arial" panose="020B0604020202020204" pitchFamily="34" charset="0"/>
-              </a:rPr>
-              <a:t>We’ll be talking about </a:t>
-            </a:r>
-            <a:r>
-              <a:rPr lang="en-US" dirty="0">
-                <a:solidFill>
-                  <a:srgbClr val="1B75BC"/>
-                </a:solidFill>
-                <a:latin typeface="Arial" panose="020B0604020202020204" pitchFamily="34" charset="0"/>
-                <a:cs typeface="Arial" panose="020B0604020202020204" pitchFamily="34" charset="0"/>
-              </a:rPr>
-              <a:t>32bit x86</a:t>
-            </a:r>
-            <a:r>
-              <a:rPr lang="en-US" dirty="0">
-                <a:latin typeface="Arial" panose="020B0604020202020204" pitchFamily="34" charset="0"/>
-                <a:cs typeface="Arial" panose="020B0604020202020204" pitchFamily="34" charset="0"/>
-              </a:rPr>
-              <a:t> instruction set</a:t>
-            </a:r>
-          </a:p>
-          <a:p>
-            <a:pPr marL="457200" lvl="1" indent="-457200" hangingPunct="0">
-              <a:spcBef>
-                <a:spcPts val="0"/>
-              </a:spcBef>
-              <a:spcAft>
-                <a:spcPts val="1414"/>
-              </a:spcAft>
-              <a:buSzPct val="100000"/>
-            </a:pPr>
-            <a:r>
-              <a:rPr lang="en-US" sz="3200" dirty="0">
-                <a:latin typeface="Arial" panose="020B0604020202020204" pitchFamily="34" charset="0"/>
-                <a:cs typeface="Arial" panose="020B0604020202020204" pitchFamily="34" charset="0"/>
-              </a:rPr>
-              <a:t>The version of xv6 we will be using in this class is a 32bit operating system</a:t>
-            </a:r>
-          </a:p>
-          <a:p>
-            <a:pPr marL="457200" lvl="1" indent="-457200" hangingPunct="0">
-              <a:spcBef>
-                <a:spcPts val="0"/>
-              </a:spcBef>
-              <a:spcAft>
-                <a:spcPts val="1414"/>
-              </a:spcAft>
-              <a:buSzPct val="100000"/>
-            </a:pPr>
-            <a:r>
-              <a:rPr lang="en-US" sz="3200" dirty="0">
-                <a:latin typeface="Arial" panose="020B0604020202020204" pitchFamily="34" charset="0"/>
-                <a:cs typeface="Arial" panose="020B0604020202020204" pitchFamily="34" charset="0"/>
-              </a:rPr>
-              <a:t>You’re welcome to take a look at the 64bit port</a:t>
-            </a:r>
-          </a:p>
-          <a:p>
-            <a:pPr marL="457200" lvl="1" indent="-457200" hangingPunct="0">
-              <a:spcBef>
-                <a:spcPts val="0"/>
-              </a:spcBef>
-              <a:spcAft>
-                <a:spcPts val="1414"/>
-              </a:spcAft>
-              <a:buSzPct val="100000"/>
-            </a:pPr>
-            <a:endParaRPr lang="en-US" sz="3200" dirty="0">
-              <a:latin typeface="Arial" panose="020B0604020202020204" pitchFamily="34" charset="0"/>
-              <a:cs typeface="Arial" panose="020B0604020202020204" pitchFamily="34" charset="0"/>
-            </a:endParaRPr>
           </a:p>
         </p:txBody>
       </p:sp>

</xml_diff>